<commit_message>
supervised models update + pptx
</commit_message>
<xml_diff>
--- a/Steam Review Predictions.pptx
+++ b/Steam Review Predictions.pptx
@@ -5,10 +5,10 @@
     <p:sldMasterId id="2147483648" r:id="rId1"/>
   </p:sldMasterIdLst>
   <p:notesMasterIdLst>
-    <p:notesMasterId r:id="rId20"/>
+    <p:notesMasterId r:id="rId22"/>
   </p:notesMasterIdLst>
   <p:handoutMasterIdLst>
-    <p:handoutMasterId r:id="rId21"/>
+    <p:handoutMasterId r:id="rId23"/>
   </p:handoutMasterIdLst>
   <p:sldIdLst>
     <p:sldId id="260" r:id="rId2"/>
@@ -24,11 +24,13 @@
     <p:sldId id="266" r:id="rId12"/>
     <p:sldId id="277" r:id="rId13"/>
     <p:sldId id="278" r:id="rId14"/>
-    <p:sldId id="269" r:id="rId15"/>
-    <p:sldId id="270" r:id="rId16"/>
-    <p:sldId id="271" r:id="rId17"/>
-    <p:sldId id="273" r:id="rId18"/>
-    <p:sldId id="281" r:id="rId19"/>
+    <p:sldId id="283" r:id="rId15"/>
+    <p:sldId id="285" r:id="rId16"/>
+    <p:sldId id="269" r:id="rId17"/>
+    <p:sldId id="270" r:id="rId18"/>
+    <p:sldId id="271" r:id="rId19"/>
+    <p:sldId id="273" r:id="rId20"/>
+    <p:sldId id="281" r:id="rId21"/>
   </p:sldIdLst>
   <p:sldSz cx="9144000" cy="5143500" type="screen16x9"/>
   <p:notesSz cx="6858000" cy="9144000"/>
@@ -226,7 +228,7 @@
           <a:p>
             <a:fld id="{177B9070-9281-4B15-842B-9B135EE24603}" type="datetimeFigureOut">
               <a:rPr lang="de-AT" smtClean="0"/>
-              <a:t>21.10.2024</a:t>
+              <a:t>23.10.2024</a:t>
             </a:fld>
             <a:endParaRPr lang="de-AT"/>
           </a:p>
@@ -391,7 +393,7 @@
           <a:p>
             <a:fld id="{843A4CAD-2332-440A-B5F3-F5F26A7FAEC2}" type="datetimeFigureOut">
               <a:rPr lang="en-US" smtClean="0"/>
-              <a:t>10/21/2024</a:t>
+              <a:t>10/23/2024</a:t>
             </a:fld>
             <a:endParaRPr lang="en-US"/>
           </a:p>
@@ -8052,6 +8054,1606 @@
 <file path=ppt/slides/slide14.xml><?xml version="1.0" encoding="utf-8"?>
 <p:sld xmlns:a="http://schemas.openxmlformats.org/drawingml/2006/main" xmlns:r="http://schemas.openxmlformats.org/officeDocument/2006/relationships" xmlns:p="http://schemas.openxmlformats.org/presentationml/2006/main">
   <p:cSld>
+    <p:spTree>
+      <p:nvGrpSpPr>
+        <p:cNvPr id="1" name=""/>
+        <p:cNvGrpSpPr/>
+        <p:nvPr/>
+      </p:nvGrpSpPr>
+      <p:grpSpPr>
+        <a:xfrm>
+          <a:off x="0" y="0"/>
+          <a:ext cx="0" cy="0"/>
+          <a:chOff x="0" y="0"/>
+          <a:chExt cx="0" cy="0"/>
+        </a:xfrm>
+      </p:grpSpPr>
+      <p:sp>
+        <p:nvSpPr>
+          <p:cNvPr id="2" name="Titel 1">
+            <a:extLst>
+              <a:ext uri="{FF2B5EF4-FFF2-40B4-BE49-F238E27FC236}">
+                <a16:creationId xmlns:a16="http://schemas.microsoft.com/office/drawing/2014/main" id="{008EFCED-3C4A-4055-461D-6238D644D354}"/>
+              </a:ext>
+            </a:extLst>
+          </p:cNvPr>
+          <p:cNvSpPr>
+            <a:spLocks noGrp="1"/>
+          </p:cNvSpPr>
+          <p:nvPr>
+            <p:ph type="title"/>
+          </p:nvPr>
+        </p:nvSpPr>
+        <p:spPr>
+          <a:xfrm>
+            <a:off x="571499" y="571500"/>
+            <a:ext cx="2414155" cy="3961840"/>
+          </a:xfrm>
+        </p:spPr>
+        <p:txBody>
+          <a:bodyPr vert="horz" lIns="91440" tIns="45720" rIns="91440" bIns="45720" rtlCol="0" anchor="t">
+            <a:normAutofit/>
+          </a:bodyPr>
+          <a:lstStyle/>
+          <a:p>
+            <a:pPr defTabSz="914400"/>
+            <a:r>
+              <a:rPr lang="en-GB" sz="3200"/>
+              <a:t>Experiment</a:t>
+            </a:r>
+            <a:br>
+              <a:rPr lang="en-GB" sz="3200"/>
+            </a:br>
+            <a:r>
+              <a:rPr lang="en-GB" sz="3200"/>
+              <a:t>Supervised Learning</a:t>
+            </a:r>
+            <a:endParaRPr lang="en-US" sz="3200" kern="1200" dirty="0">
+              <a:solidFill>
+                <a:schemeClr val="tx1"/>
+              </a:solidFill>
+              <a:latin typeface="+mj-lt"/>
+              <a:ea typeface="+mj-ea"/>
+              <a:cs typeface="+mj-cs"/>
+            </a:endParaRPr>
+          </a:p>
+        </p:txBody>
+      </p:sp>
+      <p:sp>
+        <p:nvSpPr>
+          <p:cNvPr id="6" name="Rectangle 1">
+            <a:extLst>
+              <a:ext uri="{FF2B5EF4-FFF2-40B4-BE49-F238E27FC236}">
+                <a16:creationId xmlns:a16="http://schemas.microsoft.com/office/drawing/2014/main" id="{69304948-D831-D9B4-526E-C426C90190D9}"/>
+              </a:ext>
+            </a:extLst>
+          </p:cNvPr>
+          <p:cNvSpPr>
+            <a:spLocks noGrp="1" noChangeArrowheads="1"/>
+          </p:cNvSpPr>
+          <p:nvPr>
+            <p:ph type="body" sz="quarter" idx="14"/>
+          </p:nvPr>
+        </p:nvSpPr>
+        <p:spPr bwMode="auto">
+          <a:xfrm>
+            <a:off x="3975652" y="571501"/>
+            <a:ext cx="4696949" cy="3961839"/>
+          </a:xfrm>
+          <a:prstGeom prst="rect">
+            <a:avLst/>
+          </a:prstGeom>
+          <a:extLst>
+            <a:ext uri="{909E8E84-426E-40DD-AFC4-6F175D3DCCD1}">
+              <a14:hiddenFill xmlns:a14="http://schemas.microsoft.com/office/drawing/2010/main">
+                <a:solidFill>
+                  <a:schemeClr val="accent1"/>
+                </a:solidFill>
+              </a14:hiddenFill>
+            </a:ext>
+            <a:ext uri="{91240B29-F687-4F45-9708-019B960494DF}">
+              <a14:hiddenLine xmlns:a14="http://schemas.microsoft.com/office/drawing/2010/main" w="9525">
+                <a:solidFill>
+                  <a:schemeClr val="tx1"/>
+                </a:solidFill>
+                <a:miter lim="800000"/>
+                <a:headEnd/>
+                <a:tailEnd/>
+              </a14:hiddenLine>
+            </a:ext>
+            <a:ext uri="{AF507438-7753-43E0-B8FC-AC1667EBCBE1}">
+              <a14:hiddenEffects xmlns:a14="http://schemas.microsoft.com/office/drawing/2010/main">
+                <a:effectLst>
+                  <a:outerShdw dist="35921" dir="2700000" algn="ctr" rotWithShape="0">
+                    <a:schemeClr val="bg2"/>
+                  </a:outerShdw>
+                </a:effectLst>
+              </a14:hiddenEffects>
+            </a:ext>
+          </a:extLst>
+        </p:spPr>
+        <p:txBody>
+          <a:bodyPr vert="horz" lIns="91440" tIns="45720" rIns="91440" bIns="45720" numCol="1" rtlCol="0" anchor="t" anchorCtr="0" compatLnSpc="1">
+            <a:prstTxWarp prst="textNoShape">
+              <a:avLst/>
+            </a:prstTxWarp>
+            <a:normAutofit/>
+          </a:bodyPr>
+          <a:lstStyle/>
+          <a:p>
+            <a:pPr marL="0" marR="0" lvl="0" indent="-228600" defTabSz="914400" fontAlgn="base">
+              <a:spcBef>
+                <a:spcPct val="0"/>
+              </a:spcBef>
+              <a:spcAft>
+                <a:spcPts val="600"/>
+              </a:spcAft>
+              <a:buClrTx/>
+              <a:buSzTx/>
+              <a:tabLst/>
+            </a:pPr>
+            <a:r>
+              <a:rPr lang="en-US" altLang="de-DE" sz="1200" b="1">
+                <a:latin typeface="+mn-lt"/>
+                <a:cs typeface="+mn-cs"/>
+              </a:rPr>
+              <a:t>Extra Preprocessing</a:t>
+            </a:r>
+            <a:r>
+              <a:rPr kumimoji="0" lang="en-US" altLang="de-DE" sz="1200" b="1" i="0" u="none" strike="noStrike" cap="none" normalizeH="0" baseline="0">
+                <a:ln>
+                  <a:noFill/>
+                </a:ln>
+                <a:effectLst/>
+                <a:latin typeface="+mn-lt"/>
+                <a:cs typeface="+mn-cs"/>
+              </a:rPr>
+              <a:t>:</a:t>
+            </a:r>
+            <a:endParaRPr kumimoji="0" lang="en-US" altLang="de-DE" sz="1200" b="0" i="0" u="none" strike="noStrike" cap="none" normalizeH="0" baseline="0">
+              <a:ln>
+                <a:noFill/>
+              </a:ln>
+              <a:effectLst/>
+              <a:latin typeface="+mn-lt"/>
+              <a:cs typeface="+mn-cs"/>
+            </a:endParaRPr>
+          </a:p>
+          <a:p>
+            <a:pPr marL="342891" lvl="1" indent="-228600" defTabSz="914400" fontAlgn="base">
+              <a:spcBef>
+                <a:spcPct val="0"/>
+              </a:spcBef>
+              <a:spcAft>
+                <a:spcPts val="600"/>
+              </a:spcAft>
+            </a:pPr>
+            <a:r>
+              <a:rPr lang="en-US" altLang="de-DE" sz="1200">
+                <a:latin typeface="+mn-lt"/>
+                <a:cs typeface="+mn-cs"/>
+              </a:rPr>
+              <a:t>Nur noch lowercase Text vorhanden</a:t>
+            </a:r>
+            <a:endParaRPr kumimoji="0" lang="en-US" altLang="de-DE" sz="1200" i="0" u="none" strike="noStrike" cap="none" normalizeH="0" baseline="0">
+              <a:ln>
+                <a:noFill/>
+              </a:ln>
+              <a:effectLst/>
+              <a:latin typeface="+mn-lt"/>
+              <a:cs typeface="+mn-cs"/>
+            </a:endParaRPr>
+          </a:p>
+          <a:p>
+            <a:pPr marL="0" marR="0" lvl="0" indent="-228600" defTabSz="914400" fontAlgn="base">
+              <a:spcBef>
+                <a:spcPct val="0"/>
+              </a:spcBef>
+              <a:spcAft>
+                <a:spcPts val="600"/>
+              </a:spcAft>
+              <a:buClrTx/>
+              <a:buSzTx/>
+              <a:tabLst/>
+            </a:pPr>
+            <a:r>
+              <a:rPr kumimoji="0" lang="en-US" altLang="de-DE" sz="1200" b="1" i="0" u="none" strike="noStrike" cap="none" normalizeH="0" baseline="0">
+                <a:ln>
+                  <a:noFill/>
+                </a:ln>
+                <a:effectLst/>
+                <a:latin typeface="+mn-lt"/>
+                <a:cs typeface="+mn-cs"/>
+              </a:rPr>
+              <a:t>Embeddings Word2Vec :</a:t>
+            </a:r>
+            <a:endParaRPr lang="en-US" altLang="de-DE" sz="1200">
+              <a:latin typeface="+mn-lt"/>
+              <a:cs typeface="+mn-cs"/>
+            </a:endParaRPr>
+          </a:p>
+          <a:p>
+            <a:pPr lvl="1" indent="-228600" defTabSz="914400" fontAlgn="base">
+              <a:spcBef>
+                <a:spcPct val="0"/>
+              </a:spcBef>
+              <a:spcAft>
+                <a:spcPts val="600"/>
+              </a:spcAft>
+            </a:pPr>
+            <a:r>
+              <a:rPr kumimoji="0" lang="en-US" altLang="de-DE" sz="1200" b="1" i="0" u="none" strike="noStrike" cap="none" normalizeH="0" baseline="0">
+                <a:ln>
+                  <a:noFill/>
+                </a:ln>
+                <a:effectLst/>
+                <a:latin typeface="+mn-lt"/>
+                <a:cs typeface="+mn-cs"/>
+              </a:rPr>
+              <a:t>Skip Gram </a:t>
+            </a:r>
+            <a:r>
+              <a:rPr kumimoji="0" lang="en-US" altLang="de-DE" sz="1200" i="0" u="none" strike="noStrike" cap="none" normalizeH="0" baseline="0">
+                <a:ln>
+                  <a:noFill/>
+                </a:ln>
+                <a:effectLst/>
+                <a:latin typeface="+mn-lt"/>
+                <a:cs typeface="+mn-cs"/>
+              </a:rPr>
+              <a:t>100/300</a:t>
+            </a:r>
+            <a:r>
+              <a:rPr kumimoji="0" lang="en-US" altLang="de-DE" sz="1200" b="1" i="0" u="none" strike="noStrike" cap="none" normalizeH="0" baseline="0">
+                <a:ln>
+                  <a:noFill/>
+                </a:ln>
+                <a:effectLst/>
+                <a:latin typeface="+mn-lt"/>
+                <a:cs typeface="+mn-cs"/>
+              </a:rPr>
+              <a:t>, CBOW </a:t>
+            </a:r>
+            <a:r>
+              <a:rPr kumimoji="0" lang="en-US" altLang="de-DE" sz="1200" i="0" u="none" strike="noStrike" cap="none" normalizeH="0" baseline="0">
+                <a:ln>
+                  <a:noFill/>
+                </a:ln>
+                <a:effectLst/>
+                <a:latin typeface="+mn-lt"/>
+                <a:cs typeface="+mn-cs"/>
+              </a:rPr>
+              <a:t>300</a:t>
+            </a:r>
+          </a:p>
+          <a:p>
+            <a:pPr marL="0" marR="0" lvl="0" indent="-228600" defTabSz="914400" fontAlgn="base">
+              <a:spcBef>
+                <a:spcPct val="0"/>
+              </a:spcBef>
+              <a:spcAft>
+                <a:spcPts val="600"/>
+              </a:spcAft>
+              <a:buClrTx/>
+              <a:buSzTx/>
+              <a:tabLst/>
+            </a:pPr>
+            <a:r>
+              <a:rPr kumimoji="0" lang="en-US" altLang="de-DE" sz="1200" b="1" i="0" u="none" strike="noStrike" cap="none" normalizeH="0" baseline="0">
+                <a:ln>
+                  <a:noFill/>
+                </a:ln>
+                <a:effectLst/>
+                <a:latin typeface="+mn-lt"/>
+                <a:cs typeface="+mn-cs"/>
+              </a:rPr>
+              <a:t>Modelle:</a:t>
+            </a:r>
+            <a:endParaRPr kumimoji="0" lang="en-US" altLang="de-DE" sz="1200" b="0" i="0" u="none" strike="noStrike" cap="none" normalizeH="0" baseline="0">
+              <a:ln>
+                <a:noFill/>
+              </a:ln>
+              <a:effectLst/>
+              <a:latin typeface="+mn-lt"/>
+              <a:cs typeface="+mn-cs"/>
+            </a:endParaRPr>
+          </a:p>
+          <a:p>
+            <a:pPr lvl="1" indent="-228600" defTabSz="914400" fontAlgn="base">
+              <a:spcBef>
+                <a:spcPct val="0"/>
+              </a:spcBef>
+              <a:spcAft>
+                <a:spcPts val="600"/>
+              </a:spcAft>
+            </a:pPr>
+            <a:r>
+              <a:rPr kumimoji="0" lang="en-US" altLang="de-DE" sz="1200" b="1" i="0" u="none" strike="noStrike" cap="none" normalizeH="0" baseline="0">
+                <a:ln>
+                  <a:noFill/>
+                </a:ln>
+                <a:effectLst/>
+                <a:latin typeface="+mn-lt"/>
+                <a:cs typeface="+mn-cs"/>
+              </a:rPr>
+              <a:t>Random Forest </a:t>
+            </a:r>
+            <a:r>
+              <a:rPr kumimoji="0" lang="en-US" altLang="de-DE" sz="1200" i="0" u="none" strike="noStrike" cap="none" normalizeH="0" baseline="0">
+                <a:ln>
+                  <a:noFill/>
+                </a:ln>
+                <a:effectLst/>
+                <a:latin typeface="+mn-lt"/>
+                <a:cs typeface="+mn-cs"/>
+              </a:rPr>
+              <a:t>(10, 100 Bäume)</a:t>
+            </a:r>
+          </a:p>
+          <a:p>
+            <a:pPr lvl="1" indent="-228600" defTabSz="914400" fontAlgn="base">
+              <a:spcBef>
+                <a:spcPct val="0"/>
+              </a:spcBef>
+              <a:spcAft>
+                <a:spcPts val="600"/>
+              </a:spcAft>
+            </a:pPr>
+            <a:r>
+              <a:rPr kumimoji="0" lang="en-US" altLang="de-DE" sz="1200" b="1" i="0" u="none" strike="noStrike" cap="none" normalizeH="0" baseline="0">
+                <a:ln>
+                  <a:noFill/>
+                </a:ln>
+                <a:effectLst/>
+                <a:latin typeface="+mn-lt"/>
+                <a:cs typeface="+mn-cs"/>
+              </a:rPr>
+              <a:t>Logistische Regression </a:t>
+            </a:r>
+            <a:r>
+              <a:rPr kumimoji="0" lang="en-US" altLang="de-DE" sz="1200" i="0" u="none" strike="noStrike" cap="none" normalizeH="0" baseline="0">
+                <a:ln>
+                  <a:noFill/>
+                </a:ln>
+                <a:effectLst/>
+                <a:latin typeface="+mn-lt"/>
+                <a:cs typeface="+mn-cs"/>
+              </a:rPr>
+              <a:t>(10, 100, 100 Iterationen)</a:t>
+            </a:r>
+          </a:p>
+          <a:p>
+            <a:pPr marL="0" indent="-228600" defTabSz="914400" fontAlgn="base">
+              <a:spcBef>
+                <a:spcPct val="0"/>
+              </a:spcBef>
+              <a:spcAft>
+                <a:spcPts val="600"/>
+              </a:spcAft>
+            </a:pPr>
+            <a:r>
+              <a:rPr kumimoji="0" lang="en-US" altLang="de-DE" sz="1200" b="1" i="0" u="none" strike="noStrike" cap="none" normalizeH="0" baseline="0">
+                <a:ln>
+                  <a:noFill/>
+                </a:ln>
+                <a:effectLst/>
+                <a:latin typeface="+mn-lt"/>
+                <a:cs typeface="+mn-cs"/>
+              </a:rPr>
+              <a:t>Experiment:</a:t>
+            </a:r>
+          </a:p>
+          <a:p>
+            <a:pPr lvl="1" indent="-228600" defTabSz="914400" fontAlgn="base">
+              <a:spcBef>
+                <a:spcPct val="0"/>
+              </a:spcBef>
+              <a:spcAft>
+                <a:spcPts val="600"/>
+              </a:spcAft>
+            </a:pPr>
+            <a:r>
+              <a:rPr lang="en-US" altLang="de-DE" sz="1200">
+                <a:latin typeface="+mn-lt"/>
+                <a:cs typeface="+mn-cs"/>
+              </a:rPr>
+              <a:t>Für alle Modelle </a:t>
+            </a:r>
+            <a:r>
+              <a:rPr lang="en-US" altLang="de-DE" sz="1200" b="1">
+                <a:latin typeface="+mn-lt"/>
+                <a:cs typeface="+mn-cs"/>
+              </a:rPr>
+              <a:t>class_weight</a:t>
+            </a:r>
+            <a:r>
+              <a:rPr lang="en-US" altLang="de-DE" sz="1200">
+                <a:latin typeface="+mn-lt"/>
+                <a:cs typeface="+mn-cs"/>
+              </a:rPr>
+              <a:t> = ‘balanced’/None testen</a:t>
+            </a:r>
+          </a:p>
+          <a:p>
+            <a:pPr lvl="1" indent="-228600" defTabSz="914400" fontAlgn="base">
+              <a:spcBef>
+                <a:spcPct val="0"/>
+              </a:spcBef>
+              <a:spcAft>
+                <a:spcPts val="600"/>
+              </a:spcAft>
+            </a:pPr>
+            <a:r>
+              <a:rPr lang="en-US" altLang="de-DE" sz="1200">
+                <a:latin typeface="+mn-lt"/>
+                <a:cs typeface="+mn-cs"/>
+              </a:rPr>
+              <a:t>Besten Modelle mit </a:t>
+            </a:r>
+            <a:r>
+              <a:rPr lang="en-US" altLang="de-DE" sz="1200" b="1">
+                <a:latin typeface="+mn-lt"/>
+                <a:cs typeface="+mn-cs"/>
+              </a:rPr>
+              <a:t>Emotionen</a:t>
+            </a:r>
+            <a:r>
+              <a:rPr lang="en-US" altLang="de-DE" sz="1200">
+                <a:latin typeface="+mn-lt"/>
+                <a:cs typeface="+mn-cs"/>
+              </a:rPr>
+              <a:t> auch ohne testen</a:t>
+            </a:r>
+            <a:endParaRPr kumimoji="0" lang="en-US" altLang="de-DE" sz="1200" b="1" i="0" u="none" strike="noStrike" cap="none" normalizeH="0" baseline="0">
+              <a:ln>
+                <a:noFill/>
+              </a:ln>
+              <a:effectLst/>
+              <a:latin typeface="+mn-lt"/>
+              <a:cs typeface="+mn-cs"/>
+            </a:endParaRPr>
+          </a:p>
+          <a:p>
+            <a:pPr marL="0" indent="-228600" defTabSz="914400" fontAlgn="base">
+              <a:spcBef>
+                <a:spcPct val="0"/>
+              </a:spcBef>
+              <a:spcAft>
+                <a:spcPts val="600"/>
+              </a:spcAft>
+            </a:pPr>
+            <a:r>
+              <a:rPr lang="en-US" altLang="de-DE" sz="1200" b="1">
+                <a:latin typeface="+mn-lt"/>
+                <a:cs typeface="+mn-cs"/>
+              </a:rPr>
+              <a:t>Fazit: </a:t>
+            </a:r>
+            <a:endParaRPr kumimoji="0" lang="en-US" altLang="de-DE" sz="1200" i="0" u="none" strike="noStrike" cap="none" normalizeH="0" baseline="0">
+              <a:ln>
+                <a:noFill/>
+              </a:ln>
+              <a:effectLst/>
+              <a:latin typeface="+mn-lt"/>
+              <a:cs typeface="+mn-cs"/>
+            </a:endParaRPr>
+          </a:p>
+          <a:p>
+            <a:pPr lvl="1" indent="-228600" defTabSz="914400" fontAlgn="base">
+              <a:spcBef>
+                <a:spcPct val="0"/>
+              </a:spcBef>
+              <a:spcAft>
+                <a:spcPts val="600"/>
+              </a:spcAft>
+            </a:pPr>
+            <a:r>
+              <a:rPr lang="en-US" altLang="de-DE" sz="1200" b="1">
+                <a:latin typeface="+mn-lt"/>
+                <a:cs typeface="+mn-cs"/>
+              </a:rPr>
+              <a:t>Kein</a:t>
+            </a:r>
+            <a:r>
+              <a:rPr lang="en-US" altLang="de-DE" sz="1200">
+                <a:latin typeface="+mn-lt"/>
+                <a:cs typeface="+mn-cs"/>
+              </a:rPr>
+              <a:t> class weight!</a:t>
+            </a:r>
+          </a:p>
+          <a:p>
+            <a:pPr lvl="1" indent="-228600" defTabSz="914400" fontAlgn="base">
+              <a:spcBef>
+                <a:spcPct val="0"/>
+              </a:spcBef>
+              <a:spcAft>
+                <a:spcPts val="600"/>
+              </a:spcAft>
+            </a:pPr>
+            <a:r>
+              <a:rPr lang="en-US" altLang="de-DE" sz="1200" b="1">
+                <a:latin typeface="+mn-lt"/>
+                <a:cs typeface="+mn-cs"/>
+              </a:rPr>
+              <a:t>Skip Gram 300 </a:t>
+            </a:r>
+            <a:r>
+              <a:rPr lang="en-US" altLang="de-DE" sz="1200">
+                <a:latin typeface="+mn-lt"/>
+                <a:cs typeface="+mn-cs"/>
+              </a:rPr>
+              <a:t>am besten bei 100 Iterationen/Bäumen</a:t>
+            </a:r>
+          </a:p>
+          <a:p>
+            <a:pPr lvl="1" indent="-228600" defTabSz="914400" fontAlgn="base">
+              <a:spcBef>
+                <a:spcPct val="0"/>
+              </a:spcBef>
+              <a:spcAft>
+                <a:spcPts val="600"/>
+              </a:spcAft>
+            </a:pPr>
+            <a:r>
+              <a:rPr lang="en-US" altLang="de-DE" sz="1200">
+                <a:latin typeface="+mn-lt"/>
+                <a:cs typeface="+mn-cs"/>
+              </a:rPr>
+              <a:t>Mit </a:t>
+            </a:r>
+            <a:r>
+              <a:rPr lang="en-US" altLang="de-DE" sz="1200" b="1">
+                <a:latin typeface="+mn-lt"/>
+                <a:cs typeface="+mn-cs"/>
+              </a:rPr>
+              <a:t>Emotionen</a:t>
+            </a:r>
+            <a:r>
+              <a:rPr lang="en-US" altLang="de-DE" sz="1200">
+                <a:latin typeface="+mn-lt"/>
+                <a:cs typeface="+mn-cs"/>
+              </a:rPr>
+              <a:t> vor allem besserer Recall</a:t>
+            </a:r>
+          </a:p>
+          <a:p>
+            <a:pPr lvl="1" indent="-228600" defTabSz="914400" fontAlgn="base">
+              <a:spcBef>
+                <a:spcPct val="0"/>
+              </a:spcBef>
+              <a:spcAft>
+                <a:spcPts val="600"/>
+              </a:spcAft>
+            </a:pPr>
+            <a:r>
+              <a:rPr lang="en-US" altLang="de-DE" sz="1200" b="1">
+                <a:latin typeface="+mn-lt"/>
+                <a:cs typeface="+mn-cs"/>
+              </a:rPr>
+              <a:t>Gute </a:t>
+            </a:r>
+            <a:r>
+              <a:rPr lang="en-US" altLang="de-DE" sz="1200">
+                <a:latin typeface="+mn-lt"/>
+                <a:cs typeface="+mn-cs"/>
+              </a:rPr>
+              <a:t>Resultate für geringe Trainingszeit</a:t>
+            </a:r>
+          </a:p>
+          <a:p>
+            <a:pPr lvl="1" indent="-228600" defTabSz="914400" fontAlgn="base">
+              <a:spcBef>
+                <a:spcPct val="0"/>
+              </a:spcBef>
+              <a:spcAft>
+                <a:spcPts val="600"/>
+              </a:spcAft>
+            </a:pPr>
+            <a:endParaRPr kumimoji="0" lang="en-US" altLang="de-DE" sz="1200" b="0" i="0" u="none" strike="noStrike" cap="none" normalizeH="0" baseline="0" dirty="0">
+              <a:ln>
+                <a:noFill/>
+              </a:ln>
+              <a:effectLst/>
+              <a:latin typeface="+mn-lt"/>
+              <a:cs typeface="+mn-cs"/>
+            </a:endParaRPr>
+          </a:p>
+        </p:txBody>
+      </p:sp>
+      <p:sp>
+        <p:nvSpPr>
+          <p:cNvPr id="4" name="Fußzeilenplatzhalter 3">
+            <a:extLst>
+              <a:ext uri="{FF2B5EF4-FFF2-40B4-BE49-F238E27FC236}">
+                <a16:creationId xmlns:a16="http://schemas.microsoft.com/office/drawing/2014/main" id="{E3CFBFC4-EA1C-061A-3F33-AF41F3C1BD80}"/>
+              </a:ext>
+            </a:extLst>
+          </p:cNvPr>
+          <p:cNvSpPr>
+            <a:spLocks noGrp="1"/>
+          </p:cNvSpPr>
+          <p:nvPr>
+            <p:ph type="ftr" sz="quarter" idx="12"/>
+          </p:nvPr>
+        </p:nvSpPr>
+        <p:spPr>
+          <a:xfrm>
+            <a:off x="3975652" y="4767262"/>
+            <a:ext cx="3522763" cy="273844"/>
+          </a:xfrm>
+        </p:spPr>
+        <p:txBody>
+          <a:bodyPr vert="horz" lIns="91440" tIns="45720" rIns="91440" bIns="45720" rtlCol="0" anchor="ctr">
+            <a:normAutofit/>
+          </a:bodyPr>
+          <a:lstStyle/>
+          <a:p>
+            <a:pPr algn="l">
+              <a:lnSpc>
+                <a:spcPct val="90000"/>
+              </a:lnSpc>
+              <a:spcAft>
+                <a:spcPts val="600"/>
+              </a:spcAft>
+            </a:pPr>
+            <a:r>
+              <a:rPr lang="en-US" sz="900" kern="1200">
+                <a:latin typeface="+mn-lt"/>
+                <a:ea typeface="+mn-ea"/>
+                <a:cs typeface="+mn-cs"/>
+              </a:rPr>
+              <a:t>Steam Review Prediction | Grau, Kosma, Yildiz | 24.10.2024</a:t>
+            </a:r>
+            <a:endParaRPr lang="en-US" sz="900" kern="1200" dirty="0">
+              <a:latin typeface="+mn-lt"/>
+              <a:ea typeface="+mn-ea"/>
+              <a:cs typeface="+mn-cs"/>
+            </a:endParaRPr>
+          </a:p>
+        </p:txBody>
+      </p:sp>
+      <p:sp>
+        <p:nvSpPr>
+          <p:cNvPr id="5" name="Foliennummernplatzhalter 4">
+            <a:extLst>
+              <a:ext uri="{FF2B5EF4-FFF2-40B4-BE49-F238E27FC236}">
+                <a16:creationId xmlns:a16="http://schemas.microsoft.com/office/drawing/2014/main" id="{D5B27879-B407-A3FD-32F3-1E2605CD8491}"/>
+              </a:ext>
+            </a:extLst>
+          </p:cNvPr>
+          <p:cNvSpPr>
+            <a:spLocks noGrp="1"/>
+          </p:cNvSpPr>
+          <p:nvPr>
+            <p:ph type="sldNum" sz="quarter" idx="13"/>
+          </p:nvPr>
+        </p:nvSpPr>
+        <p:spPr>
+          <a:xfrm>
+            <a:off x="6549390" y="4767262"/>
+            <a:ext cx="2395169" cy="273844"/>
+          </a:xfrm>
+        </p:spPr>
+        <p:txBody>
+          <a:bodyPr vert="horz" lIns="91440" tIns="45720" rIns="91440" bIns="45720" rtlCol="0" anchor="ctr">
+            <a:normAutofit/>
+          </a:bodyPr>
+          <a:lstStyle/>
+          <a:p>
+            <a:pPr>
+              <a:lnSpc>
+                <a:spcPct val="90000"/>
+              </a:lnSpc>
+              <a:spcAft>
+                <a:spcPts val="600"/>
+              </a:spcAft>
+            </a:pPr>
+            <a:fld id="{9C057DB4-583E-41A7-BD94-987342018C17}" type="slidenum">
+              <a:rPr lang="en-US" sz="1200" smtClean="0"/>
+              <a:pPr>
+                <a:lnSpc>
+                  <a:spcPct val="90000"/>
+                </a:lnSpc>
+                <a:spcAft>
+                  <a:spcPts val="600"/>
+                </a:spcAft>
+              </a:pPr>
+              <a:t>14</a:t>
+            </a:fld>
+            <a:endParaRPr lang="en-US" sz="1200"/>
+          </a:p>
+        </p:txBody>
+      </p:sp>
+    </p:spTree>
+    <p:extLst>
+      <p:ext uri="{BB962C8B-B14F-4D97-AF65-F5344CB8AC3E}">
+        <p14:creationId xmlns:p14="http://schemas.microsoft.com/office/powerpoint/2010/main" val="2661557495"/>
+      </p:ext>
+    </p:extLst>
+  </p:cSld>
+  <p:clrMapOvr>
+    <a:masterClrMapping/>
+  </p:clrMapOvr>
+</p:sld>
+</file>
+
+<file path=ppt/slides/slide15.xml><?xml version="1.0" encoding="utf-8"?>
+<p:sld xmlns:a="http://schemas.openxmlformats.org/drawingml/2006/main" xmlns:r="http://schemas.openxmlformats.org/officeDocument/2006/relationships" xmlns:p="http://schemas.openxmlformats.org/presentationml/2006/main">
+  <p:cSld>
+    <p:spTree>
+      <p:nvGrpSpPr>
+        <p:cNvPr id="1" name=""/>
+        <p:cNvGrpSpPr/>
+        <p:nvPr/>
+      </p:nvGrpSpPr>
+      <p:grpSpPr>
+        <a:xfrm>
+          <a:off x="0" y="0"/>
+          <a:ext cx="0" cy="0"/>
+          <a:chOff x="0" y="0"/>
+          <a:chExt cx="0" cy="0"/>
+        </a:xfrm>
+      </p:grpSpPr>
+      <p:sp>
+        <p:nvSpPr>
+          <p:cNvPr id="2" name="Titel 1">
+            <a:extLst>
+              <a:ext uri="{FF2B5EF4-FFF2-40B4-BE49-F238E27FC236}">
+                <a16:creationId xmlns:a16="http://schemas.microsoft.com/office/drawing/2014/main" id="{53A7C667-00FF-597A-23E1-185635D52265}"/>
+              </a:ext>
+            </a:extLst>
+          </p:cNvPr>
+          <p:cNvSpPr>
+            <a:spLocks noGrp="1"/>
+          </p:cNvSpPr>
+          <p:nvPr>
+            <p:ph type="title"/>
+          </p:nvPr>
+        </p:nvSpPr>
+        <p:spPr>
+          <a:xfrm>
+            <a:off x="442168" y="183556"/>
+            <a:ext cx="5261624" cy="926419"/>
+          </a:xfrm>
+        </p:spPr>
+        <p:txBody>
+          <a:bodyPr vert="horz" lIns="91440" tIns="45720" rIns="91440" bIns="45720" rtlCol="0" anchor="ctr">
+            <a:normAutofit/>
+          </a:bodyPr>
+          <a:lstStyle/>
+          <a:p>
+            <a:pPr defTabSz="914400"/>
+            <a:r>
+              <a:rPr lang="en-US" kern="1200" dirty="0">
+                <a:solidFill>
+                  <a:schemeClr val="tx1"/>
+                </a:solidFill>
+                <a:latin typeface="+mj-lt"/>
+                <a:ea typeface="+mj-ea"/>
+                <a:cs typeface="+mj-cs"/>
+              </a:rPr>
+              <a:t>Experiment Results SV</a:t>
+            </a:r>
+          </a:p>
+        </p:txBody>
+      </p:sp>
+      <p:sp>
+        <p:nvSpPr>
+          <p:cNvPr id="3" name="Textplatzhalter 2">
+            <a:extLst>
+              <a:ext uri="{FF2B5EF4-FFF2-40B4-BE49-F238E27FC236}">
+                <a16:creationId xmlns:a16="http://schemas.microsoft.com/office/drawing/2014/main" id="{C11E1F86-E085-E8E0-9A62-D617985E8AEA}"/>
+              </a:ext>
+            </a:extLst>
+          </p:cNvPr>
+          <p:cNvSpPr>
+            <a:spLocks noGrp="1"/>
+          </p:cNvSpPr>
+          <p:nvPr>
+            <p:ph type="body" sz="quarter" idx="14"/>
+          </p:nvPr>
+        </p:nvSpPr>
+        <p:spPr>
+          <a:xfrm>
+            <a:off x="5703792" y="183555"/>
+            <a:ext cx="3086101" cy="926420"/>
+          </a:xfrm>
+        </p:spPr>
+        <p:txBody>
+          <a:bodyPr vert="horz" lIns="91440" tIns="45720" rIns="91440" bIns="45720" rtlCol="0" anchor="ctr">
+            <a:normAutofit/>
+          </a:bodyPr>
+          <a:lstStyle/>
+          <a:p>
+            <a:pPr marL="0" indent="0" defTabSz="914400">
+              <a:spcBef>
+                <a:spcPts val="1000"/>
+              </a:spcBef>
+              <a:buNone/>
+            </a:pPr>
+            <a:r>
+              <a:rPr lang="en-US" sz="1500" kern="1200" dirty="0">
+                <a:solidFill>
+                  <a:schemeClr val="tx1"/>
+                </a:solidFill>
+                <a:latin typeface="+mn-lt"/>
+                <a:ea typeface="+mn-ea"/>
+                <a:cs typeface="+mn-cs"/>
+              </a:rPr>
+              <a:t>Auf </a:t>
+            </a:r>
+            <a:r>
+              <a:rPr lang="en-US" sz="1500" kern="1200" dirty="0" err="1">
+                <a:solidFill>
+                  <a:schemeClr val="tx1"/>
+                </a:solidFill>
+                <a:latin typeface="+mn-lt"/>
+                <a:ea typeface="+mn-ea"/>
+                <a:cs typeface="+mn-cs"/>
+              </a:rPr>
+              <a:t>allen</a:t>
+            </a:r>
+            <a:r>
+              <a:rPr lang="en-US" sz="1500" kern="1200" dirty="0">
+                <a:solidFill>
+                  <a:schemeClr val="tx1"/>
+                </a:solidFill>
+                <a:latin typeface="+mn-lt"/>
+                <a:ea typeface="+mn-ea"/>
+                <a:cs typeface="+mn-cs"/>
+              </a:rPr>
+              <a:t> ~350k </a:t>
+            </a:r>
+            <a:r>
+              <a:rPr lang="en-US" sz="1500" kern="1200" dirty="0" err="1">
+                <a:solidFill>
+                  <a:schemeClr val="tx1"/>
+                </a:solidFill>
+                <a:latin typeface="+mn-lt"/>
+                <a:ea typeface="+mn-ea"/>
+                <a:cs typeface="+mn-cs"/>
+              </a:rPr>
+              <a:t>Daten</a:t>
+            </a:r>
+            <a:endParaRPr lang="en-US" sz="1500" kern="1200" dirty="0">
+              <a:solidFill>
+                <a:schemeClr val="tx1"/>
+              </a:solidFill>
+              <a:latin typeface="+mn-lt"/>
+              <a:ea typeface="+mn-ea"/>
+              <a:cs typeface="+mn-cs"/>
+            </a:endParaRPr>
+          </a:p>
+        </p:txBody>
+      </p:sp>
+      <p:sp>
+        <p:nvSpPr>
+          <p:cNvPr id="4" name="Fußzeilenplatzhalter 3">
+            <a:extLst>
+              <a:ext uri="{FF2B5EF4-FFF2-40B4-BE49-F238E27FC236}">
+                <a16:creationId xmlns:a16="http://schemas.microsoft.com/office/drawing/2014/main" id="{C024A4FF-0051-7794-E6E5-05E12D1A2DA2}"/>
+              </a:ext>
+            </a:extLst>
+          </p:cNvPr>
+          <p:cNvSpPr>
+            <a:spLocks noGrp="1"/>
+          </p:cNvSpPr>
+          <p:nvPr>
+            <p:ph type="ftr" sz="quarter" idx="12"/>
+          </p:nvPr>
+        </p:nvSpPr>
+        <p:spPr>
+          <a:xfrm>
+            <a:off x="3028950" y="4767262"/>
+            <a:ext cx="3086100" cy="273844"/>
+          </a:xfrm>
+        </p:spPr>
+        <p:txBody>
+          <a:bodyPr vert="horz" lIns="91440" tIns="45720" rIns="91440" bIns="45720" rtlCol="0" anchor="ctr">
+            <a:normAutofit/>
+          </a:bodyPr>
+          <a:lstStyle/>
+          <a:p>
+            <a:pPr algn="ctr">
+              <a:lnSpc>
+                <a:spcPct val="90000"/>
+              </a:lnSpc>
+              <a:spcAft>
+                <a:spcPts val="600"/>
+              </a:spcAft>
+            </a:pPr>
+            <a:r>
+              <a:rPr lang="en-US" sz="800" kern="1200">
+                <a:latin typeface="+mn-lt"/>
+                <a:ea typeface="+mn-ea"/>
+                <a:cs typeface="+mn-cs"/>
+              </a:rPr>
+              <a:t>Steam Review Prediction | Grau, Kosma, Yildiz | 24.10.2024</a:t>
+            </a:r>
+          </a:p>
+        </p:txBody>
+      </p:sp>
+      <p:sp>
+        <p:nvSpPr>
+          <p:cNvPr id="5" name="Foliennummernplatzhalter 4">
+            <a:extLst>
+              <a:ext uri="{FF2B5EF4-FFF2-40B4-BE49-F238E27FC236}">
+                <a16:creationId xmlns:a16="http://schemas.microsoft.com/office/drawing/2014/main" id="{CD840E4B-22FA-6A02-E71B-562281DF328B}"/>
+              </a:ext>
+            </a:extLst>
+          </p:cNvPr>
+          <p:cNvSpPr>
+            <a:spLocks noGrp="1"/>
+          </p:cNvSpPr>
+          <p:nvPr>
+            <p:ph type="sldNum" sz="quarter" idx="13"/>
+          </p:nvPr>
+        </p:nvSpPr>
+        <p:spPr>
+          <a:xfrm>
+            <a:off x="6549390" y="4767262"/>
+            <a:ext cx="2399541" cy="273844"/>
+          </a:xfrm>
+        </p:spPr>
+        <p:txBody>
+          <a:bodyPr vert="horz" lIns="91440" tIns="45720" rIns="91440" bIns="45720" rtlCol="0" anchor="ctr">
+            <a:normAutofit/>
+          </a:bodyPr>
+          <a:lstStyle/>
+          <a:p>
+            <a:pPr>
+              <a:lnSpc>
+                <a:spcPct val="90000"/>
+              </a:lnSpc>
+              <a:spcAft>
+                <a:spcPts val="600"/>
+              </a:spcAft>
+            </a:pPr>
+            <a:fld id="{9C057DB4-583E-41A7-BD94-987342018C17}" type="slidenum">
+              <a:rPr lang="en-US" sz="1200"/>
+              <a:pPr>
+                <a:lnSpc>
+                  <a:spcPct val="90000"/>
+                </a:lnSpc>
+                <a:spcAft>
+                  <a:spcPts val="600"/>
+                </a:spcAft>
+              </a:pPr>
+              <a:t>15</a:t>
+            </a:fld>
+            <a:endParaRPr lang="en-US" sz="1200"/>
+          </a:p>
+        </p:txBody>
+      </p:sp>
+      <p:graphicFrame>
+        <p:nvGraphicFramePr>
+          <p:cNvPr id="8" name="Tabelle 7">
+            <a:extLst>
+              <a:ext uri="{FF2B5EF4-FFF2-40B4-BE49-F238E27FC236}">
+                <a16:creationId xmlns:a16="http://schemas.microsoft.com/office/drawing/2014/main" id="{805B74D2-9663-B70D-9714-8B03E725799C}"/>
+              </a:ext>
+            </a:extLst>
+          </p:cNvPr>
+          <p:cNvGraphicFramePr>
+            <a:graphicFrameLocks noGrp="1"/>
+          </p:cNvGraphicFramePr>
+          <p:nvPr>
+            <p:extLst>
+              <p:ext uri="{D42A27DB-BD31-4B8C-83A1-F6EECF244321}">
+                <p14:modId xmlns:p14="http://schemas.microsoft.com/office/powerpoint/2010/main" val="3081372419"/>
+              </p:ext>
+            </p:extLst>
+          </p:nvPr>
+        </p:nvGraphicFramePr>
+        <p:xfrm>
+          <a:off x="573206" y="2004145"/>
+          <a:ext cx="7971551" cy="1328133"/>
+        </p:xfrm>
+        <a:graphic>
+          <a:graphicData uri="http://schemas.openxmlformats.org/drawingml/2006/table">
+            <a:tbl>
+              <a:tblPr firstRow="1" bandRow="1">
+                <a:tableStyleId>{5C22544A-7EE6-4342-B048-85BDC9FD1C3A}</a:tableStyleId>
+              </a:tblPr>
+              <a:tblGrid>
+                <a:gridCol w="1635272">
+                  <a:extLst>
+                    <a:ext uri="{9D8B030D-6E8A-4147-A177-3AD203B41FA5}">
+                      <a16:colId xmlns:a16="http://schemas.microsoft.com/office/drawing/2014/main" val="1278542406"/>
+                    </a:ext>
+                  </a:extLst>
+                </a:gridCol>
+                <a:gridCol w="1609391">
+                  <a:extLst>
+                    <a:ext uri="{9D8B030D-6E8A-4147-A177-3AD203B41FA5}">
+                      <a16:colId xmlns:a16="http://schemas.microsoft.com/office/drawing/2014/main" val="1776770650"/>
+                    </a:ext>
+                  </a:extLst>
+                </a:gridCol>
+                <a:gridCol w="1508106">
+                  <a:extLst>
+                    <a:ext uri="{9D8B030D-6E8A-4147-A177-3AD203B41FA5}">
+                      <a16:colId xmlns:a16="http://schemas.microsoft.com/office/drawing/2014/main" val="819898919"/>
+                    </a:ext>
+                  </a:extLst>
+                </a:gridCol>
+                <a:gridCol w="1609391">
+                  <a:extLst>
+                    <a:ext uri="{9D8B030D-6E8A-4147-A177-3AD203B41FA5}">
+                      <a16:colId xmlns:a16="http://schemas.microsoft.com/office/drawing/2014/main" val="3984184555"/>
+                    </a:ext>
+                  </a:extLst>
+                </a:gridCol>
+                <a:gridCol w="1609391">
+                  <a:extLst>
+                    <a:ext uri="{9D8B030D-6E8A-4147-A177-3AD203B41FA5}">
+                      <a16:colId xmlns:a16="http://schemas.microsoft.com/office/drawing/2014/main" val="27559245"/>
+                    </a:ext>
+                  </a:extLst>
+                </a:gridCol>
+              </a:tblGrid>
+              <a:tr h="265019">
+                <a:tc>
+                  <a:txBody>
+                    <a:bodyPr/>
+                    <a:lstStyle/>
+                    <a:p>
+                      <a:r>
+                        <a:rPr lang="de-DE" sz="1000" dirty="0"/>
+                        <a:t>Methode</a:t>
+                      </a:r>
+                      <a:endParaRPr lang="de-AT" sz="1000" dirty="0"/>
+                    </a:p>
+                  </a:txBody>
+                  <a:tcPr marL="81964" marR="81964" marT="40982" marB="40982"/>
+                </a:tc>
+                <a:tc>
+                  <a:txBody>
+                    <a:bodyPr/>
+                    <a:lstStyle/>
+                    <a:p>
+                      <a:r>
+                        <a:rPr lang="de-DE" sz="1000"/>
+                        <a:t>Precision</a:t>
+                      </a:r>
+                      <a:endParaRPr lang="de-AT" sz="1000"/>
+                    </a:p>
+                  </a:txBody>
+                  <a:tcPr marL="81964" marR="81964" marT="40982" marB="40982"/>
+                </a:tc>
+                <a:tc>
+                  <a:txBody>
+                    <a:bodyPr/>
+                    <a:lstStyle/>
+                    <a:p>
+                      <a:r>
+                        <a:rPr lang="de-DE" sz="1000"/>
+                        <a:t>Recall</a:t>
+                      </a:r>
+                      <a:endParaRPr lang="de-AT" sz="1000"/>
+                    </a:p>
+                  </a:txBody>
+                  <a:tcPr marL="81964" marR="81964" marT="40982" marB="40982"/>
+                </a:tc>
+                <a:tc>
+                  <a:txBody>
+                    <a:bodyPr/>
+                    <a:lstStyle/>
+                    <a:p>
+                      <a:r>
+                        <a:rPr lang="de-DE" sz="1000"/>
+                        <a:t>Accuracy</a:t>
+                      </a:r>
+                      <a:endParaRPr lang="de-AT" sz="1000"/>
+                    </a:p>
+                  </a:txBody>
+                  <a:tcPr marL="81964" marR="81964" marT="40982" marB="40982"/>
+                </a:tc>
+                <a:tc>
+                  <a:txBody>
+                    <a:bodyPr/>
+                    <a:lstStyle/>
+                    <a:p>
+                      <a:r>
+                        <a:rPr lang="de-DE" sz="1000"/>
+                        <a:t>F1 Score</a:t>
+                      </a:r>
+                      <a:endParaRPr lang="de-AT" sz="1000"/>
+                    </a:p>
+                  </a:txBody>
+                  <a:tcPr marL="81964" marR="81964" marT="40982" marB="40982"/>
+                </a:tc>
+                <a:extLst>
+                  <a:ext uri="{0D108BD9-81ED-4DB2-BD59-A6C34878D82A}">
+                    <a16:rowId xmlns:a16="http://schemas.microsoft.com/office/drawing/2014/main" val="3371502406"/>
+                  </a:ext>
+                </a:extLst>
+              </a:tr>
+              <a:tr h="265019">
+                <a:tc>
+                  <a:txBody>
+                    <a:bodyPr/>
+                    <a:lstStyle/>
+                    <a:p>
+                      <a:r>
+                        <a:rPr lang="de-DE" sz="1000" dirty="0"/>
+                        <a:t>Best </a:t>
+                      </a:r>
+                      <a:r>
+                        <a:rPr lang="de-DE" sz="1000" dirty="0" err="1"/>
+                        <a:t>LogReg</a:t>
+                      </a:r>
+                      <a:endParaRPr lang="de-AT" sz="1000" dirty="0"/>
+                    </a:p>
+                  </a:txBody>
+                  <a:tcPr marL="81964" marR="81964" marT="40982" marB="40982"/>
+                </a:tc>
+                <a:tc>
+                  <a:txBody>
+                    <a:bodyPr/>
+                    <a:lstStyle/>
+                    <a:p>
+                      <a:r>
+                        <a:rPr lang="de-DE" sz="1000" dirty="0"/>
+                        <a:t>0.84</a:t>
+                      </a:r>
+                      <a:endParaRPr lang="de-AT" sz="1000" dirty="0"/>
+                    </a:p>
+                  </a:txBody>
+                  <a:tcPr marL="81964" marR="81964" marT="40982" marB="40982"/>
+                </a:tc>
+                <a:tc>
+                  <a:txBody>
+                    <a:bodyPr/>
+                    <a:lstStyle/>
+                    <a:p>
+                      <a:r>
+                        <a:rPr lang="de-DE" sz="1000" dirty="0"/>
+                        <a:t>0.79</a:t>
+                      </a:r>
+                      <a:endParaRPr lang="de-AT" sz="1000" dirty="0"/>
+                    </a:p>
+                  </a:txBody>
+                  <a:tcPr marL="81964" marR="81964" marT="40982" marB="40982"/>
+                </a:tc>
+                <a:tc>
+                  <a:txBody>
+                    <a:bodyPr/>
+                    <a:lstStyle/>
+                    <a:p>
+                      <a:r>
+                        <a:rPr lang="de-DE" sz="1000" dirty="0"/>
+                        <a:t>0.88</a:t>
+                      </a:r>
+                      <a:endParaRPr lang="de-AT" sz="1000" dirty="0"/>
+                    </a:p>
+                  </a:txBody>
+                  <a:tcPr marL="81964" marR="81964" marT="40982" marB="40982"/>
+                </a:tc>
+                <a:tc>
+                  <a:txBody>
+                    <a:bodyPr/>
+                    <a:lstStyle/>
+                    <a:p>
+                      <a:r>
+                        <a:rPr lang="de-DE" sz="1000" dirty="0"/>
+                        <a:t>0.81</a:t>
+                      </a:r>
+                      <a:endParaRPr lang="de-AT" sz="1000" dirty="0"/>
+                    </a:p>
+                  </a:txBody>
+                  <a:tcPr marL="81964" marR="81964" marT="40982" marB="40982"/>
+                </a:tc>
+                <a:extLst>
+                  <a:ext uri="{0D108BD9-81ED-4DB2-BD59-A6C34878D82A}">
+                    <a16:rowId xmlns:a16="http://schemas.microsoft.com/office/drawing/2014/main" val="2023731097"/>
+                  </a:ext>
+                </a:extLst>
+              </a:tr>
+              <a:tr h="247636">
+                <a:tc>
+                  <a:txBody>
+                    <a:bodyPr/>
+                    <a:lstStyle/>
+                    <a:p>
+                      <a:r>
+                        <a:rPr lang="de-DE" sz="1000" dirty="0"/>
+                        <a:t>Best RF</a:t>
+                      </a:r>
+                      <a:endParaRPr lang="de-AT" sz="1000" dirty="0"/>
+                    </a:p>
+                  </a:txBody>
+                  <a:tcPr marL="81964" marR="81964" marT="40982" marB="40982"/>
+                </a:tc>
+                <a:tc>
+                  <a:txBody>
+                    <a:bodyPr/>
+                    <a:lstStyle/>
+                    <a:p>
+                      <a:pPr marL="0" marR="0" lvl="0" indent="0" algn="l" defTabSz="685783" rtl="0" eaLnBrk="1" fontAlgn="auto" latinLnBrk="0" hangingPunct="1">
+                        <a:lnSpc>
+                          <a:spcPct val="100000"/>
+                        </a:lnSpc>
+                        <a:spcBef>
+                          <a:spcPts val="0"/>
+                        </a:spcBef>
+                        <a:spcAft>
+                          <a:spcPts val="0"/>
+                        </a:spcAft>
+                        <a:buClrTx/>
+                        <a:buSzTx/>
+                        <a:buFontTx/>
+                        <a:buNone/>
+                        <a:tabLst/>
+                        <a:defRPr/>
+                      </a:pPr>
+                      <a:r>
+                        <a:rPr lang="de-DE" sz="1000" dirty="0"/>
+                        <a:t>0.87</a:t>
+                      </a:r>
+                      <a:endParaRPr lang="de-AT" sz="1000" dirty="0"/>
+                    </a:p>
+                  </a:txBody>
+                  <a:tcPr marL="81964" marR="81964" marT="40982" marB="40982"/>
+                </a:tc>
+                <a:tc>
+                  <a:txBody>
+                    <a:bodyPr/>
+                    <a:lstStyle/>
+                    <a:p>
+                      <a:pPr marL="0" marR="0" lvl="0" indent="0" algn="l" defTabSz="685783" rtl="0" eaLnBrk="1" fontAlgn="auto" latinLnBrk="0" hangingPunct="1">
+                        <a:lnSpc>
+                          <a:spcPct val="100000"/>
+                        </a:lnSpc>
+                        <a:spcBef>
+                          <a:spcPts val="0"/>
+                        </a:spcBef>
+                        <a:spcAft>
+                          <a:spcPts val="0"/>
+                        </a:spcAft>
+                        <a:buClrTx/>
+                        <a:buSzTx/>
+                        <a:buFontTx/>
+                        <a:buNone/>
+                        <a:tabLst/>
+                        <a:defRPr/>
+                      </a:pPr>
+                      <a:r>
+                        <a:rPr lang="de-DE" sz="1000" dirty="0"/>
+                        <a:t>0.73</a:t>
+                      </a:r>
+                      <a:endParaRPr lang="de-AT" sz="1000" dirty="0"/>
+                    </a:p>
+                  </a:txBody>
+                  <a:tcPr marL="81964" marR="81964" marT="40982" marB="40982"/>
+                </a:tc>
+                <a:tc>
+                  <a:txBody>
+                    <a:bodyPr/>
+                    <a:lstStyle/>
+                    <a:p>
+                      <a:r>
+                        <a:rPr lang="de-DE" sz="1000" dirty="0"/>
+                        <a:t>0.87</a:t>
+                      </a:r>
+                      <a:endParaRPr lang="de-AT" sz="1000" dirty="0"/>
+                    </a:p>
+                  </a:txBody>
+                  <a:tcPr marL="81964" marR="81964" marT="40982" marB="40982"/>
+                </a:tc>
+                <a:tc>
+                  <a:txBody>
+                    <a:bodyPr/>
+                    <a:lstStyle/>
+                    <a:p>
+                      <a:r>
+                        <a:rPr lang="de-DE" sz="1000" dirty="0"/>
+                        <a:t>0.77</a:t>
+                      </a:r>
+                      <a:endParaRPr lang="de-AT" sz="1000" dirty="0"/>
+                    </a:p>
+                  </a:txBody>
+                  <a:tcPr marL="81964" marR="81964" marT="40982" marB="40982"/>
+                </a:tc>
+                <a:extLst>
+                  <a:ext uri="{0D108BD9-81ED-4DB2-BD59-A6C34878D82A}">
+                    <a16:rowId xmlns:a16="http://schemas.microsoft.com/office/drawing/2014/main" val="2415028359"/>
+                  </a:ext>
+                </a:extLst>
+              </a:tr>
+              <a:tr h="265019">
+                <a:tc>
+                  <a:txBody>
+                    <a:bodyPr/>
+                    <a:lstStyle/>
+                    <a:p>
+                      <a:r>
+                        <a:rPr lang="de-DE" sz="1000" dirty="0"/>
+                        <a:t>Best </a:t>
+                      </a:r>
+                      <a:r>
+                        <a:rPr lang="de-DE" sz="1000" dirty="0" err="1"/>
+                        <a:t>LogReg</a:t>
+                      </a:r>
+                      <a:r>
+                        <a:rPr lang="de-DE" sz="1000" dirty="0"/>
+                        <a:t>, Emotionen</a:t>
+                      </a:r>
+                    </a:p>
+                  </a:txBody>
+                  <a:tcPr marL="81964" marR="81964" marT="40982" marB="40982"/>
+                </a:tc>
+                <a:tc>
+                  <a:txBody>
+                    <a:bodyPr/>
+                    <a:lstStyle/>
+                    <a:p>
+                      <a:r>
+                        <a:rPr lang="de-DE" sz="1000" dirty="0"/>
+                        <a:t>0.87</a:t>
+                      </a:r>
+                      <a:endParaRPr lang="de-AT" sz="1000" dirty="0"/>
+                    </a:p>
+                  </a:txBody>
+                  <a:tcPr marL="81964" marR="81964" marT="40982" marB="40982"/>
+                </a:tc>
+                <a:tc>
+                  <a:txBody>
+                    <a:bodyPr/>
+                    <a:lstStyle/>
+                    <a:p>
+                      <a:r>
+                        <a:rPr lang="de-DE" sz="1000" b="1" dirty="0"/>
+                        <a:t>0.84</a:t>
+                      </a:r>
+                      <a:endParaRPr lang="de-AT" sz="1000" b="1" dirty="0"/>
+                    </a:p>
+                  </a:txBody>
+                  <a:tcPr marL="81964" marR="81964" marT="40982" marB="40982"/>
+                </a:tc>
+                <a:tc>
+                  <a:txBody>
+                    <a:bodyPr/>
+                    <a:lstStyle/>
+                    <a:p>
+                      <a:r>
+                        <a:rPr lang="de-AT" sz="1000" dirty="0"/>
+                        <a:t>0.90</a:t>
+                      </a:r>
+                    </a:p>
+                  </a:txBody>
+                  <a:tcPr marL="81964" marR="81964" marT="40982" marB="40982"/>
+                </a:tc>
+                <a:tc>
+                  <a:txBody>
+                    <a:bodyPr/>
+                    <a:lstStyle/>
+                    <a:p>
+                      <a:r>
+                        <a:rPr lang="de-DE" sz="1000" dirty="0"/>
+                        <a:t>0.85</a:t>
+                      </a:r>
+                      <a:endParaRPr lang="de-AT" sz="1000" dirty="0"/>
+                    </a:p>
+                  </a:txBody>
+                  <a:tcPr marL="81964" marR="81964" marT="40982" marB="40982"/>
+                </a:tc>
+                <a:extLst>
+                  <a:ext uri="{0D108BD9-81ED-4DB2-BD59-A6C34878D82A}">
+                    <a16:rowId xmlns:a16="http://schemas.microsoft.com/office/drawing/2014/main" val="2703410355"/>
+                  </a:ext>
+                </a:extLst>
+              </a:tr>
+              <a:tr h="285440">
+                <a:tc>
+                  <a:txBody>
+                    <a:bodyPr/>
+                    <a:lstStyle/>
+                    <a:p>
+                      <a:r>
+                        <a:rPr lang="de-DE" sz="1000" dirty="0"/>
+                        <a:t>Best RF, Emotionen</a:t>
+                      </a:r>
+                    </a:p>
+                  </a:txBody>
+                  <a:tcPr marL="81964" marR="81964" marT="40982" marB="40982"/>
+                </a:tc>
+                <a:tc>
+                  <a:txBody>
+                    <a:bodyPr/>
+                    <a:lstStyle/>
+                    <a:p>
+                      <a:r>
+                        <a:rPr lang="de-DE" sz="1000" b="1" dirty="0"/>
+                        <a:t>0.88</a:t>
+                      </a:r>
+                      <a:endParaRPr lang="de-AT" sz="1000" b="1" dirty="0"/>
+                    </a:p>
+                  </a:txBody>
+                  <a:tcPr marL="81964" marR="81964" marT="40982" marB="40982"/>
+                </a:tc>
+                <a:tc>
+                  <a:txBody>
+                    <a:bodyPr/>
+                    <a:lstStyle/>
+                    <a:p>
+                      <a:r>
+                        <a:rPr lang="de-DE" sz="1000"/>
+                        <a:t>0.83</a:t>
+                      </a:r>
+                      <a:endParaRPr lang="de-AT" sz="1000"/>
+                    </a:p>
+                  </a:txBody>
+                  <a:tcPr marL="81964" marR="81964" marT="40982" marB="40982"/>
+                </a:tc>
+                <a:tc>
+                  <a:txBody>
+                    <a:bodyPr/>
+                    <a:lstStyle/>
+                    <a:p>
+                      <a:r>
+                        <a:rPr lang="de-DE" sz="1000" b="1" dirty="0"/>
+                        <a:t>0.91</a:t>
+                      </a:r>
+                      <a:endParaRPr lang="de-AT" sz="1000" b="1" dirty="0"/>
+                    </a:p>
+                  </a:txBody>
+                  <a:tcPr marL="81964" marR="81964" marT="40982" marB="40982"/>
+                </a:tc>
+                <a:tc>
+                  <a:txBody>
+                    <a:bodyPr/>
+                    <a:lstStyle/>
+                    <a:p>
+                      <a:r>
+                        <a:rPr lang="de-DE" sz="1000" b="1" dirty="0"/>
+                        <a:t>0.86</a:t>
+                      </a:r>
+                      <a:endParaRPr lang="de-AT" sz="1000" b="1" dirty="0"/>
+                    </a:p>
+                  </a:txBody>
+                  <a:tcPr marL="81964" marR="81964" marT="40982" marB="40982"/>
+                </a:tc>
+                <a:extLst>
+                  <a:ext uri="{0D108BD9-81ED-4DB2-BD59-A6C34878D82A}">
+                    <a16:rowId xmlns:a16="http://schemas.microsoft.com/office/drawing/2014/main" val="883334372"/>
+                  </a:ext>
+                </a:extLst>
+              </a:tr>
+            </a:tbl>
+          </a:graphicData>
+        </a:graphic>
+      </p:graphicFrame>
+      <p:sp>
+        <p:nvSpPr>
+          <p:cNvPr id="6" name="Textfeld 5">
+            <a:extLst>
+              <a:ext uri="{FF2B5EF4-FFF2-40B4-BE49-F238E27FC236}">
+                <a16:creationId xmlns:a16="http://schemas.microsoft.com/office/drawing/2014/main" id="{6BC915C8-1DBF-1B4D-69C3-9DE36D63F31E}"/>
+              </a:ext>
+            </a:extLst>
+          </p:cNvPr>
+          <p:cNvSpPr txBox="1"/>
+          <p:nvPr/>
+        </p:nvSpPr>
+        <p:spPr>
+          <a:xfrm>
+            <a:off x="5995915" y="837020"/>
+            <a:ext cx="1978927" cy="545911"/>
+          </a:xfrm>
+          <a:prstGeom prst="rect">
+            <a:avLst/>
+          </a:prstGeom>
+        </p:spPr>
+        <p:txBody>
+          <a:bodyPr vert="horz" wrap="none" lIns="91440" tIns="45720" rIns="91440" bIns="45720" rtlCol="0" anchor="t">
+            <a:normAutofit lnSpcReduction="10000"/>
+          </a:bodyPr>
+          <a:lstStyle/>
+          <a:p>
+            <a:pPr marL="457200" indent="-457200" algn="l">
+              <a:buFont typeface="Arial" panose="020B0604020202020204" pitchFamily="34" charset="0"/>
+              <a:buChar char="•"/>
+            </a:pPr>
+            <a:r>
+              <a:rPr lang="en-US" sz="1000" kern="1200" dirty="0">
+                <a:solidFill>
+                  <a:schemeClr val="tx1"/>
+                </a:solidFill>
+                <a:latin typeface="+mn-lt"/>
+                <a:ea typeface="+mn-ea"/>
+                <a:cs typeface="+mn-cs"/>
+              </a:rPr>
+              <a:t>Skip Gram 300 </a:t>
+            </a:r>
+          </a:p>
+          <a:p>
+            <a:pPr marL="457200" indent="-457200" algn="l">
+              <a:buFont typeface="Arial" panose="020B0604020202020204" pitchFamily="34" charset="0"/>
+              <a:buChar char="•"/>
+            </a:pPr>
+            <a:r>
+              <a:rPr lang="en-US" sz="1000" kern="1200" dirty="0">
+                <a:solidFill>
+                  <a:schemeClr val="tx1"/>
+                </a:solidFill>
+                <a:latin typeface="+mn-lt"/>
+                <a:ea typeface="+mn-ea"/>
+                <a:cs typeface="+mn-cs"/>
+              </a:rPr>
+              <a:t>No class weights</a:t>
+            </a:r>
+          </a:p>
+          <a:p>
+            <a:pPr marL="457200" indent="-457200" algn="l">
+              <a:buFont typeface="Arial" panose="020B0604020202020204" pitchFamily="34" charset="0"/>
+              <a:buChar char="•"/>
+            </a:pPr>
+            <a:r>
+              <a:rPr lang="en-US" sz="1000" kern="1200" dirty="0">
+                <a:solidFill>
+                  <a:schemeClr val="tx1"/>
+                </a:solidFill>
+                <a:latin typeface="+mn-lt"/>
+                <a:ea typeface="+mn-ea"/>
+                <a:cs typeface="+mn-cs"/>
+              </a:rPr>
+              <a:t>100 </a:t>
+            </a:r>
+            <a:r>
+              <a:rPr lang="en-US" sz="1000" kern="1200" dirty="0" err="1">
+                <a:solidFill>
+                  <a:schemeClr val="tx1"/>
+                </a:solidFill>
+                <a:latin typeface="+mn-lt"/>
+                <a:ea typeface="+mn-ea"/>
+                <a:cs typeface="+mn-cs"/>
+              </a:rPr>
+              <a:t>Iterationen</a:t>
+            </a:r>
+            <a:r>
+              <a:rPr lang="en-US" sz="1000" kern="1200" dirty="0">
+                <a:solidFill>
+                  <a:schemeClr val="tx1"/>
+                </a:solidFill>
+                <a:latin typeface="+mn-lt"/>
+                <a:ea typeface="+mn-ea"/>
+                <a:cs typeface="+mn-cs"/>
+              </a:rPr>
+              <a:t>/</a:t>
+            </a:r>
+            <a:r>
+              <a:rPr lang="en-US" sz="1000" kern="1200" dirty="0" err="1">
+                <a:solidFill>
+                  <a:schemeClr val="tx1"/>
+                </a:solidFill>
+                <a:latin typeface="+mn-lt"/>
+                <a:ea typeface="+mn-ea"/>
+                <a:cs typeface="+mn-cs"/>
+              </a:rPr>
+              <a:t>Bäume</a:t>
+            </a:r>
+            <a:endParaRPr lang="en-GB" sz="1000" dirty="0"/>
+          </a:p>
+        </p:txBody>
+      </p:sp>
+    </p:spTree>
+    <p:extLst>
+      <p:ext uri="{BB962C8B-B14F-4D97-AF65-F5344CB8AC3E}">
+        <p14:creationId xmlns:p14="http://schemas.microsoft.com/office/powerpoint/2010/main" val="3149030733"/>
+      </p:ext>
+    </p:extLst>
+  </p:cSld>
+  <p:clrMapOvr>
+    <a:masterClrMapping/>
+  </p:clrMapOvr>
+</p:sld>
+</file>
+
+<file path=ppt/slides/slide16.xml><?xml version="1.0" encoding="utf-8"?>
+<p:sld xmlns:a="http://schemas.openxmlformats.org/drawingml/2006/main" xmlns:r="http://schemas.openxmlformats.org/officeDocument/2006/relationships" xmlns:p="http://schemas.openxmlformats.org/presentationml/2006/main">
+  <p:cSld>
     <p:bg>
       <p:bgPr>
         <a:solidFill>
@@ -8628,7 +10230,7 @@
                   <a:spcPts val="600"/>
                 </a:spcAft>
               </a:pPr>
-              <a:t>14</a:t>
+              <a:t>16</a:t>
             </a:fld>
             <a:endParaRPr lang="en-US" sz="1200"/>
           </a:p>
@@ -8647,7 +10249,7 @@
 </p:sld>
 </file>
 
-<file path=ppt/slides/slide15.xml><?xml version="1.0" encoding="utf-8"?>
+<file path=ppt/slides/slide17.xml><?xml version="1.0" encoding="utf-8"?>
 <p:sld xmlns:a="http://schemas.openxmlformats.org/drawingml/2006/main" xmlns:r="http://schemas.openxmlformats.org/officeDocument/2006/relationships" xmlns:p="http://schemas.openxmlformats.org/presentationml/2006/main">
   <p:cSld>
     <p:bg>
@@ -9080,7 +10682,7 @@
                   <a:spcPts val="600"/>
                 </a:spcAft>
               </a:pPr>
-              <a:t>15</a:t>
+              <a:t>17</a:t>
             </a:fld>
             <a:endParaRPr lang="en-US" sz="1200"/>
           </a:p>
@@ -9101,14 +10703,14 @@
           <p:nvPr>
             <p:extLst>
               <p:ext uri="{D42A27DB-BD31-4B8C-83A1-F6EECF244321}">
-                <p14:modId xmlns:p14="http://schemas.microsoft.com/office/powerpoint/2010/main" val="2066771853"/>
+                <p14:modId xmlns:p14="http://schemas.microsoft.com/office/powerpoint/2010/main" val="1316027757"/>
               </p:ext>
             </p:extLst>
           </p:nvPr>
         </p:nvGraphicFramePr>
         <p:xfrm>
           <a:off x="571350" y="2004145"/>
-          <a:ext cx="8001004" cy="2437991"/>
+          <a:ext cx="8001004" cy="1475363"/>
         </p:xfrm>
         <a:graphic>
           <a:graphicData uri="http://schemas.openxmlformats.org/drawingml/2006/table">
@@ -9160,10 +10762,10 @@
                     <a:lstStyle/>
                     <a:p>
                       <a:r>
-                        <a:rPr lang="de-DE" sz="1000"/>
+                        <a:rPr lang="de-DE" sz="1000" dirty="0"/>
                         <a:t>Methode</a:t>
                       </a:r>
-                      <a:endParaRPr lang="de-AT" sz="1000"/>
+                      <a:endParaRPr lang="de-AT" sz="1000" dirty="0"/>
                     </a:p>
                   </a:txBody>
                   <a:tcPr marL="81964" marR="81964" marT="40982" marB="40982"/>
@@ -9524,10 +11126,10 @@
                     <a:lstStyle/>
                     <a:p>
                       <a:r>
-                        <a:rPr lang="de-DE" sz="1000"/>
+                        <a:rPr lang="de-DE" sz="1000" dirty="0"/>
                         <a:t>0.87</a:t>
                       </a:r>
-                      <a:endParaRPr lang="de-AT" sz="1000"/>
+                      <a:endParaRPr lang="de-AT" sz="1000" dirty="0"/>
                     </a:p>
                   </a:txBody>
                   <a:tcPr marL="81964" marR="81964" marT="40982" marB="40982"/>
@@ -9535,216 +11137,6 @@
                 <a:extLst>
                   <a:ext uri="{0D108BD9-81ED-4DB2-BD59-A6C34878D82A}">
                     <a16:rowId xmlns:a16="http://schemas.microsoft.com/office/drawing/2014/main" val="2415028359"/>
-                  </a:ext>
-                </a:extLst>
-              </a:tr>
-              <a:tr h="265019">
-                <a:tc>
-                  <a:txBody>
-                    <a:bodyPr/>
-                    <a:lstStyle/>
-                    <a:p>
-                      <a:r>
-                        <a:rPr lang="de-DE" sz="1000"/>
-                        <a:t>RF, Spie, Info, Emotionen</a:t>
-                      </a:r>
-                      <a:endParaRPr lang="de-AT" sz="1000"/>
-                    </a:p>
-                  </a:txBody>
-                  <a:tcPr marL="81964" marR="81964" marT="40982" marB="40982"/>
-                </a:tc>
-                <a:tc>
-                  <a:txBody>
-                    <a:bodyPr/>
-                    <a:lstStyle/>
-                    <a:p>
-                      <a:r>
-                        <a:rPr lang="de-DE" sz="1000"/>
-                        <a:t>0.84</a:t>
-                      </a:r>
-                      <a:endParaRPr lang="de-AT" sz="1000"/>
-                    </a:p>
-                  </a:txBody>
-                  <a:tcPr marL="81964" marR="81964" marT="40982" marB="40982"/>
-                </a:tc>
-                <a:tc>
-                  <a:txBody>
-                    <a:bodyPr/>
-                    <a:lstStyle/>
-                    <a:p>
-                      <a:r>
-                        <a:rPr lang="de-DE" sz="1000"/>
-                        <a:t>0.83</a:t>
-                      </a:r>
-                      <a:endParaRPr lang="de-AT" sz="1000"/>
-                    </a:p>
-                  </a:txBody>
-                  <a:tcPr marL="81964" marR="81964" marT="40982" marB="40982"/>
-                </a:tc>
-                <a:tc>
-                  <a:txBody>
-                    <a:bodyPr/>
-                    <a:lstStyle/>
-                    <a:p>
-                      <a:r>
-                        <a:rPr lang="de-AT" sz="1000"/>
-                        <a:t>0.89</a:t>
-                      </a:r>
-                    </a:p>
-                  </a:txBody>
-                  <a:tcPr marL="81964" marR="81964" marT="40982" marB="40982"/>
-                </a:tc>
-                <a:tc>
-                  <a:txBody>
-                    <a:bodyPr/>
-                    <a:lstStyle/>
-                    <a:p>
-                      <a:r>
-                        <a:rPr lang="de-DE" sz="1000"/>
-                        <a:t>0.84</a:t>
-                      </a:r>
-                      <a:endParaRPr lang="de-AT" sz="1000"/>
-                    </a:p>
-                  </a:txBody>
-                  <a:tcPr marL="81964" marR="81964" marT="40982" marB="40982"/>
-                </a:tc>
-                <a:extLst>
-                  <a:ext uri="{0D108BD9-81ED-4DB2-BD59-A6C34878D82A}">
-                    <a16:rowId xmlns:a16="http://schemas.microsoft.com/office/drawing/2014/main" val="2703410355"/>
-                  </a:ext>
-                </a:extLst>
-              </a:tr>
-              <a:tr h="415287">
-                <a:tc>
-                  <a:txBody>
-                    <a:bodyPr/>
-                    <a:lstStyle/>
-                    <a:p>
-                      <a:r>
-                        <a:rPr lang="de-DE" sz="1000"/>
-                        <a:t>LogReg, Spiel Info, Emotionen</a:t>
-                      </a:r>
-                      <a:endParaRPr lang="de-AT" sz="1000"/>
-                    </a:p>
-                  </a:txBody>
-                  <a:tcPr marL="81964" marR="81964" marT="40982" marB="40982"/>
-                </a:tc>
-                <a:tc>
-                  <a:txBody>
-                    <a:bodyPr/>
-                    <a:lstStyle/>
-                    <a:p>
-                      <a:r>
-                        <a:rPr lang="de-DE" sz="1000"/>
-                        <a:t>0.86</a:t>
-                      </a:r>
-                      <a:endParaRPr lang="de-AT" sz="1000"/>
-                    </a:p>
-                  </a:txBody>
-                  <a:tcPr marL="81964" marR="81964" marT="40982" marB="40982"/>
-                </a:tc>
-                <a:tc>
-                  <a:txBody>
-                    <a:bodyPr/>
-                    <a:lstStyle/>
-                    <a:p>
-                      <a:r>
-                        <a:rPr lang="de-DE" sz="1000"/>
-                        <a:t>0.83</a:t>
-                      </a:r>
-                      <a:endParaRPr lang="de-AT" sz="1000"/>
-                    </a:p>
-                  </a:txBody>
-                  <a:tcPr marL="81964" marR="81964" marT="40982" marB="40982"/>
-                </a:tc>
-                <a:tc>
-                  <a:txBody>
-                    <a:bodyPr/>
-                    <a:lstStyle/>
-                    <a:p>
-                      <a:r>
-                        <a:rPr lang="de-DE" sz="1000"/>
-                        <a:t>0.90</a:t>
-                      </a:r>
-                      <a:endParaRPr lang="de-AT" sz="1000"/>
-                    </a:p>
-                  </a:txBody>
-                  <a:tcPr marL="81964" marR="81964" marT="40982" marB="40982"/>
-                </a:tc>
-                <a:tc>
-                  <a:txBody>
-                    <a:bodyPr/>
-                    <a:lstStyle/>
-                    <a:p>
-                      <a:r>
-                        <a:rPr lang="de-DE" sz="1000"/>
-                        <a:t>0.85</a:t>
-                      </a:r>
-                      <a:endParaRPr lang="de-AT" sz="1000"/>
-                    </a:p>
-                  </a:txBody>
-                  <a:tcPr marL="81964" marR="81964" marT="40982" marB="40982"/>
-                </a:tc>
-                <a:extLst>
-                  <a:ext uri="{0D108BD9-81ED-4DB2-BD59-A6C34878D82A}">
-                    <a16:rowId xmlns:a16="http://schemas.microsoft.com/office/drawing/2014/main" val="883334372"/>
-                  </a:ext>
-                </a:extLst>
-              </a:tr>
-              <a:tr h="282322">
-                <a:tc>
-                  <a:txBody>
-                    <a:bodyPr/>
-                    <a:lstStyle/>
-                    <a:p>
-                      <a:endParaRPr lang="de-AT" sz="1000"/>
-                    </a:p>
-                  </a:txBody>
-                  <a:tcPr marL="81964" marR="81964" marT="40982" marB="40982"/>
-                </a:tc>
-                <a:tc>
-                  <a:txBody>
-                    <a:bodyPr/>
-                    <a:lstStyle/>
-                    <a:p>
-                      <a:endParaRPr lang="de-AT" sz="1000"/>
-                    </a:p>
-                  </a:txBody>
-                  <a:tcPr marL="81964" marR="81964" marT="40982" marB="40982"/>
-                </a:tc>
-                <a:tc>
-                  <a:txBody>
-                    <a:bodyPr/>
-                    <a:lstStyle/>
-                    <a:p>
-                      <a:endParaRPr lang="de-AT" sz="1000"/>
-                    </a:p>
-                  </a:txBody>
-                  <a:tcPr marL="81964" marR="81964" marT="40982" marB="40982"/>
-                </a:tc>
-                <a:tc>
-                  <a:txBody>
-                    <a:bodyPr/>
-                    <a:lstStyle/>
-                    <a:p>
-                      <a:endParaRPr lang="de-AT" sz="1000"/>
-                    </a:p>
-                  </a:txBody>
-                  <a:tcPr marL="81964" marR="81964" marT="40982" marB="40982"/>
-                </a:tc>
-                <a:tc>
-                  <a:txBody>
-                    <a:bodyPr/>
-                    <a:lstStyle/>
-                    <a:p>
-                      <a:endParaRPr lang="de-AT" sz="1000"/>
-                    </a:p>
-                  </a:txBody>
-                  <a:tcPr marL="81964" marR="81964" marT="40982" marB="40982"/>
-                </a:tc>
-                <a:extLst>
-                  <a:ext uri="{0D108BD9-81ED-4DB2-BD59-A6C34878D82A}">
-                    <a16:rowId xmlns:a16="http://schemas.microsoft.com/office/drawing/2014/main" val="3585001054"/>
                   </a:ext>
                 </a:extLst>
               </a:tr>
@@ -9765,7 +11157,7 @@
 </p:sld>
 </file>
 
-<file path=ppt/slides/slide16.xml><?xml version="1.0" encoding="utf-8"?>
+<file path=ppt/slides/slide18.xml><?xml version="1.0" encoding="utf-8"?>
 <p:sld xmlns:a="http://schemas.openxmlformats.org/drawingml/2006/main" xmlns:r="http://schemas.openxmlformats.org/officeDocument/2006/relationships" xmlns:p="http://schemas.openxmlformats.org/presentationml/2006/main">
   <p:cSld>
     <p:bg>
@@ -10162,7 +11554,7 @@
                   <a:spcPts val="600"/>
                 </a:spcAft>
               </a:pPr>
-              <a:t>16</a:t>
+              <a:t>18</a:t>
             </a:fld>
             <a:endParaRPr lang="en-US" sz="1200">
               <a:solidFill>
@@ -10578,7 +11970,7 @@
 </p:sld>
 </file>
 
-<file path=ppt/slides/slide17.xml><?xml version="1.0" encoding="utf-8"?>
+<file path=ppt/slides/slide19.xml><?xml version="1.0" encoding="utf-8"?>
 <p:sld xmlns:a="http://schemas.openxmlformats.org/drawingml/2006/main" xmlns:r="http://schemas.openxmlformats.org/officeDocument/2006/relationships" xmlns:p="http://schemas.openxmlformats.org/presentationml/2006/main">
   <p:cSld>
     <p:bg>
@@ -10886,7 +12278,7 @@
                   <a:spcPts val="600"/>
                 </a:spcAft>
               </a:pPr>
-              <a:t>17</a:t>
+              <a:t>19</a:t>
             </a:fld>
             <a:endParaRPr lang="en-US" sz="1100"/>
           </a:p>
@@ -11107,516 +12499,6 @@
     <p:extLst>
       <p:ext uri="{BB962C8B-B14F-4D97-AF65-F5344CB8AC3E}">
         <p14:creationId xmlns:p14="http://schemas.microsoft.com/office/powerpoint/2010/main" val="1936196675"/>
-      </p:ext>
-    </p:extLst>
-  </p:cSld>
-  <p:clrMapOvr>
-    <a:masterClrMapping/>
-  </p:clrMapOvr>
-</p:sld>
-</file>
-
-<file path=ppt/slides/slide18.xml><?xml version="1.0" encoding="utf-8"?>
-<p:sld xmlns:a="http://schemas.openxmlformats.org/drawingml/2006/main" xmlns:r="http://schemas.openxmlformats.org/officeDocument/2006/relationships" xmlns:p="http://schemas.openxmlformats.org/presentationml/2006/main">
-  <p:cSld>
-    <p:bg>
-      <p:bgPr>
-        <a:solidFill>
-          <a:schemeClr val="bg1"/>
-        </a:solidFill>
-        <a:effectLst/>
-      </p:bgPr>
-    </p:bg>
-    <p:spTree>
-      <p:nvGrpSpPr>
-        <p:cNvPr id="1" name=""/>
-        <p:cNvGrpSpPr/>
-        <p:nvPr/>
-      </p:nvGrpSpPr>
-      <p:grpSpPr>
-        <a:xfrm>
-          <a:off x="0" y="0"/>
-          <a:ext cx="0" cy="0"/>
-          <a:chOff x="0" y="0"/>
-          <a:chExt cx="0" cy="0"/>
-        </a:xfrm>
-      </p:grpSpPr>
-      <p:sp>
-        <p:nvSpPr>
-          <p:cNvPr id="10" name="Rectangle 9">
-            <a:extLst>
-              <a:ext uri="{FF2B5EF4-FFF2-40B4-BE49-F238E27FC236}">
-                <a16:creationId xmlns:a16="http://schemas.microsoft.com/office/drawing/2014/main" id="{70DFC902-7D23-471A-B557-B6B6917D7A0D}"/>
-              </a:ext>
-              <a:ext uri="{C183D7F6-B498-43B3-948B-1728B52AA6E4}">
-                <adec:decorative xmlns:adec="http://schemas.microsoft.com/office/drawing/2017/decorative" val="1"/>
-              </a:ext>
-            </a:extLst>
-          </p:cNvPr>
-          <p:cNvSpPr>
-            <a:spLocks noGrp="1" noRot="1" noChangeAspect="1" noMove="1" noResize="1" noEditPoints="1" noAdjustHandles="1" noChangeArrowheads="1" noChangeShapeType="1" noTextEdit="1"/>
-          </p:cNvSpPr>
-          <p:nvPr>
-            <p:extLst>
-              <p:ext uri="{386F3935-93C4-4BCD-93E2-E3B085C9AB24}">
-                <p16:designElem xmlns:p16="http://schemas.microsoft.com/office/powerpoint/2015/main" val="1"/>
-              </p:ext>
-            </p:extLst>
-          </p:nvPr>
-        </p:nvSpPr>
-        <p:spPr>
-          <a:xfrm>
-            <a:off x="7" y="-4278"/>
-            <a:ext cx="9143993" cy="1270758"/>
-          </a:xfrm>
-          <a:prstGeom prst="rect">
-            <a:avLst/>
-          </a:prstGeom>
-          <a:solidFill>
-            <a:schemeClr val="tx1">
-              <a:lumMod val="85000"/>
-              <a:lumOff val="15000"/>
-            </a:schemeClr>
-          </a:solidFill>
-          <a:ln>
-            <a:noFill/>
-          </a:ln>
-        </p:spPr>
-        <p:style>
-          <a:lnRef idx="2">
-            <a:schemeClr val="accent1">
-              <a:shade val="50000"/>
-            </a:schemeClr>
-          </a:lnRef>
-          <a:fillRef idx="1">
-            <a:schemeClr val="accent1"/>
-          </a:fillRef>
-          <a:effectRef idx="0">
-            <a:schemeClr val="accent1"/>
-          </a:effectRef>
-          <a:fontRef idx="minor">
-            <a:schemeClr val="lt1"/>
-          </a:fontRef>
-        </p:style>
-        <p:txBody>
-          <a:bodyPr rtlCol="0" anchor="ctr"/>
-          <a:lstStyle/>
-          <a:p>
-            <a:pPr algn="ctr"/>
-            <a:endParaRPr lang="en-US"/>
-          </a:p>
-        </p:txBody>
-      </p:sp>
-      <p:sp>
-        <p:nvSpPr>
-          <p:cNvPr id="2" name="Titel 1">
-            <a:extLst>
-              <a:ext uri="{FF2B5EF4-FFF2-40B4-BE49-F238E27FC236}">
-                <a16:creationId xmlns:a16="http://schemas.microsoft.com/office/drawing/2014/main" id="{AA173CEB-E837-0BAE-03A0-7E71432F2425}"/>
-              </a:ext>
-            </a:extLst>
-          </p:cNvPr>
-          <p:cNvSpPr>
-            <a:spLocks noGrp="1"/>
-          </p:cNvSpPr>
-          <p:nvPr>
-            <p:ph type="title"/>
-          </p:nvPr>
-        </p:nvSpPr>
-        <p:spPr>
-          <a:xfrm>
-            <a:off x="867638" y="478321"/>
-            <a:ext cx="7416372" cy="675098"/>
-          </a:xfrm>
-        </p:spPr>
-        <p:txBody>
-          <a:bodyPr vert="horz" lIns="91440" tIns="45720" rIns="91440" bIns="45720" rtlCol="0" anchor="t">
-            <a:normAutofit/>
-          </a:bodyPr>
-          <a:lstStyle/>
-          <a:p>
-            <a:pPr defTabSz="914400"/>
-            <a:r>
-              <a:rPr lang="en-US" sz="2100" b="1" kern="1200">
-                <a:solidFill>
-                  <a:schemeClr val="bg1"/>
-                </a:solidFill>
-                <a:latin typeface="+mj-lt"/>
-                <a:ea typeface="+mj-ea"/>
-                <a:cs typeface="+mj-cs"/>
-              </a:rPr>
-              <a:t>Conclusion</a:t>
-            </a:r>
-            <a:br>
-              <a:rPr lang="en-US" sz="2100" b="1" kern="1200">
-                <a:solidFill>
-                  <a:schemeClr val="bg1"/>
-                </a:solidFill>
-                <a:latin typeface="+mj-lt"/>
-                <a:ea typeface="+mj-ea"/>
-                <a:cs typeface="+mj-cs"/>
-              </a:rPr>
-            </a:br>
-            <a:endParaRPr lang="en-US" sz="2100" kern="1200">
-              <a:solidFill>
-                <a:schemeClr val="bg1"/>
-              </a:solidFill>
-              <a:latin typeface="+mj-lt"/>
-              <a:ea typeface="+mj-ea"/>
-              <a:cs typeface="+mj-cs"/>
-            </a:endParaRPr>
-          </a:p>
-        </p:txBody>
-      </p:sp>
-      <p:sp>
-        <p:nvSpPr>
-          <p:cNvPr id="12" name="Rectangle 11">
-            <a:extLst>
-              <a:ext uri="{FF2B5EF4-FFF2-40B4-BE49-F238E27FC236}">
-                <a16:creationId xmlns:a16="http://schemas.microsoft.com/office/drawing/2014/main" id="{A55D5633-D557-4DCA-982C-FF36EB7A1C00}"/>
-              </a:ext>
-              <a:ext uri="{C183D7F6-B498-43B3-948B-1728B52AA6E4}">
-                <adec:decorative xmlns:adec="http://schemas.microsoft.com/office/drawing/2017/decorative" val="1"/>
-              </a:ext>
-            </a:extLst>
-          </p:cNvPr>
-          <p:cNvSpPr>
-            <a:spLocks noGrp="1" noRot="1" noChangeAspect="1" noMove="1" noResize="1" noEditPoints="1" noAdjustHandles="1" noChangeArrowheads="1" noChangeShapeType="1" noTextEdit="1"/>
-          </p:cNvSpPr>
-          <p:nvPr>
-            <p:extLst>
-              <p:ext uri="{386F3935-93C4-4BCD-93E2-E3B085C9AB24}">
-                <p16:designElem xmlns:p16="http://schemas.microsoft.com/office/powerpoint/2015/main" val="1"/>
-              </p:ext>
-            </p:extLst>
-          </p:nvPr>
-        </p:nvSpPr>
-        <p:spPr>
-          <a:xfrm>
-            <a:off x="0" y="1266480"/>
-            <a:ext cx="9143992" cy="3877020"/>
-          </a:xfrm>
-          <a:prstGeom prst="rect">
-            <a:avLst/>
-          </a:prstGeom>
-          <a:solidFill>
-            <a:schemeClr val="bg1">
-              <a:lumMod val="95000"/>
-            </a:schemeClr>
-          </a:solidFill>
-          <a:ln>
-            <a:noFill/>
-          </a:ln>
-        </p:spPr>
-        <p:style>
-          <a:lnRef idx="2">
-            <a:schemeClr val="accent1">
-              <a:shade val="50000"/>
-            </a:schemeClr>
-          </a:lnRef>
-          <a:fillRef idx="1">
-            <a:schemeClr val="accent1"/>
-          </a:fillRef>
-          <a:effectRef idx="0">
-            <a:schemeClr val="accent1"/>
-          </a:effectRef>
-          <a:fontRef idx="minor">
-            <a:schemeClr val="lt1"/>
-          </a:fontRef>
-        </p:style>
-        <p:txBody>
-          <a:bodyPr rtlCol="0" anchor="ctr"/>
-          <a:lstStyle/>
-          <a:p>
-            <a:pPr algn="ctr"/>
-            <a:endParaRPr lang="en-US"/>
-          </a:p>
-        </p:txBody>
-      </p:sp>
-      <p:sp>
-        <p:nvSpPr>
-          <p:cNvPr id="14" name="Rectangle 13">
-            <a:extLst>
-              <a:ext uri="{FF2B5EF4-FFF2-40B4-BE49-F238E27FC236}">
-                <a16:creationId xmlns:a16="http://schemas.microsoft.com/office/drawing/2014/main" id="{450D3AD2-FA80-415F-A9CE-54D884561CD7}"/>
-              </a:ext>
-              <a:ext uri="{C183D7F6-B498-43B3-948B-1728B52AA6E4}">
-                <adec:decorative xmlns:adec="http://schemas.microsoft.com/office/drawing/2017/decorative" val="1"/>
-              </a:ext>
-            </a:extLst>
-          </p:cNvPr>
-          <p:cNvSpPr>
-            <a:spLocks noGrp="1" noRot="1" noChangeAspect="1" noMove="1" noResize="1" noEditPoints="1" noAdjustHandles="1" noChangeArrowheads="1" noChangeShapeType="1" noTextEdit="1"/>
-          </p:cNvSpPr>
-          <p:nvPr>
-            <p:extLst>
-              <p:ext uri="{386F3935-93C4-4BCD-93E2-E3B085C9AB24}">
-                <p16:designElem xmlns:p16="http://schemas.microsoft.com/office/powerpoint/2015/main" val="1"/>
-              </p:ext>
-            </p:extLst>
-          </p:nvPr>
-        </p:nvSpPr>
-        <p:spPr>
-          <a:xfrm>
-            <a:off x="867638" y="1508068"/>
-            <a:ext cx="342892" cy="34289"/>
-          </a:xfrm>
-          <a:prstGeom prst="rect">
-            <a:avLst/>
-          </a:prstGeom>
-          <a:solidFill>
-            <a:schemeClr val="tx1"/>
-          </a:solidFill>
-          <a:ln>
-            <a:noFill/>
-          </a:ln>
-        </p:spPr>
-        <p:style>
-          <a:lnRef idx="2">
-            <a:schemeClr val="accent1">
-              <a:shade val="50000"/>
-            </a:schemeClr>
-          </a:lnRef>
-          <a:fillRef idx="1">
-            <a:schemeClr val="accent1"/>
-          </a:fillRef>
-          <a:effectRef idx="0">
-            <a:schemeClr val="accent1"/>
-          </a:effectRef>
-          <a:fontRef idx="minor">
-            <a:schemeClr val="lt1"/>
-          </a:fontRef>
-        </p:style>
-        <p:txBody>
-          <a:bodyPr rtlCol="0" anchor="ctr"/>
-          <a:lstStyle/>
-          <a:p>
-            <a:pPr algn="ctr"/>
-            <a:endParaRPr lang="en-US"/>
-          </a:p>
-        </p:txBody>
-      </p:sp>
-      <p:sp>
-        <p:nvSpPr>
-          <p:cNvPr id="5" name="Foliennummernplatzhalter 4">
-            <a:extLst>
-              <a:ext uri="{FF2B5EF4-FFF2-40B4-BE49-F238E27FC236}">
-                <a16:creationId xmlns:a16="http://schemas.microsoft.com/office/drawing/2014/main" id="{EF8A3997-E730-C444-741A-2A39A636108C}"/>
-              </a:ext>
-            </a:extLst>
-          </p:cNvPr>
-          <p:cNvSpPr>
-            <a:spLocks noGrp="1"/>
-          </p:cNvSpPr>
-          <p:nvPr>
-            <p:ph type="sldNum" sz="quarter" idx="13"/>
-          </p:nvPr>
-        </p:nvSpPr>
-        <p:spPr>
-          <a:xfrm>
-            <a:off x="120650" y="2434829"/>
-            <a:ext cx="504718" cy="257826"/>
-          </a:xfrm>
-        </p:spPr>
-        <p:txBody>
-          <a:bodyPr vert="horz" lIns="91440" tIns="45720" rIns="91440" bIns="45720" rtlCol="0" anchor="ctr">
-            <a:normAutofit/>
-          </a:bodyPr>
-          <a:lstStyle/>
-          <a:p>
-            <a:pPr algn="ctr">
-              <a:lnSpc>
-                <a:spcPct val="90000"/>
-              </a:lnSpc>
-              <a:spcAft>
-                <a:spcPts val="600"/>
-              </a:spcAft>
-            </a:pPr>
-            <a:fld id="{9C057DB4-583E-41A7-BD94-987342018C17}" type="slidenum">
-              <a:rPr lang="en-US" sz="1100"/>
-              <a:pPr algn="ctr">
-                <a:lnSpc>
-                  <a:spcPct val="90000"/>
-                </a:lnSpc>
-                <a:spcAft>
-                  <a:spcPts val="600"/>
-                </a:spcAft>
-              </a:pPr>
-              <a:t>18</a:t>
-            </a:fld>
-            <a:endParaRPr lang="en-US" sz="1100"/>
-          </a:p>
-        </p:txBody>
-      </p:sp>
-      <p:sp>
-        <p:nvSpPr>
-          <p:cNvPr id="4" name="Fußzeilenplatzhalter 3">
-            <a:extLst>
-              <a:ext uri="{FF2B5EF4-FFF2-40B4-BE49-F238E27FC236}">
-                <a16:creationId xmlns:a16="http://schemas.microsoft.com/office/drawing/2014/main" id="{7AAE7A8F-5FC3-6455-6DC9-5F4477588EF8}"/>
-              </a:ext>
-            </a:extLst>
-          </p:cNvPr>
-          <p:cNvSpPr>
-            <a:spLocks noGrp="1"/>
-          </p:cNvSpPr>
-          <p:nvPr>
-            <p:ph type="ftr" sz="quarter" idx="12"/>
-          </p:nvPr>
-        </p:nvSpPr>
-        <p:spPr>
-          <a:xfrm rot="5400000">
-            <a:off x="-262383" y="3919521"/>
-            <a:ext cx="1247620" cy="235134"/>
-          </a:xfrm>
-        </p:spPr>
-        <p:txBody>
-          <a:bodyPr vert="horz" lIns="91440" tIns="45720" rIns="91440" bIns="45720" rtlCol="0" anchor="ctr">
-            <a:normAutofit/>
-          </a:bodyPr>
-          <a:lstStyle/>
-          <a:p>
-            <a:pPr>
-              <a:lnSpc>
-                <a:spcPct val="90000"/>
-              </a:lnSpc>
-              <a:spcAft>
-                <a:spcPts val="600"/>
-              </a:spcAft>
-            </a:pPr>
-            <a:r>
-              <a:rPr lang="en-US" sz="500" kern="1200">
-                <a:latin typeface="+mn-lt"/>
-                <a:ea typeface="+mn-ea"/>
-                <a:cs typeface="+mn-cs"/>
-              </a:rPr>
-              <a:t>Steam Review Prediction | Grau, Kosma, Yildiz | 24.10.2024</a:t>
-            </a:r>
-          </a:p>
-        </p:txBody>
-      </p:sp>
-      <p:sp>
-        <p:nvSpPr>
-          <p:cNvPr id="3" name="Textplatzhalter 2">
-            <a:extLst>
-              <a:ext uri="{FF2B5EF4-FFF2-40B4-BE49-F238E27FC236}">
-                <a16:creationId xmlns:a16="http://schemas.microsoft.com/office/drawing/2014/main" id="{36BD0A61-2E8F-D955-F135-C67AC5AB44B6}"/>
-              </a:ext>
-            </a:extLst>
-          </p:cNvPr>
-          <p:cNvSpPr>
-            <a:spLocks noGrp="1"/>
-          </p:cNvSpPr>
-          <p:nvPr>
-            <p:ph type="body" sz="quarter" idx="14"/>
-          </p:nvPr>
-        </p:nvSpPr>
-        <p:spPr>
-          <a:xfrm>
-            <a:off x="866661" y="1663007"/>
-            <a:ext cx="7410669" cy="2969714"/>
-          </a:xfrm>
-        </p:spPr>
-        <p:txBody>
-          <a:bodyPr vert="horz" lIns="91440" tIns="45720" rIns="91440" bIns="45720" rtlCol="0">
-            <a:normAutofit/>
-          </a:bodyPr>
-          <a:lstStyle/>
-          <a:p>
-            <a:pPr indent="-228600" defTabSz="914400"/>
-            <a:r>
-              <a:rPr lang="en-US" sz="1800">
-                <a:latin typeface="+mn-lt"/>
-                <a:cs typeface="+mn-cs"/>
-              </a:rPr>
-              <a:t>Der </a:t>
-            </a:r>
-            <a:r>
-              <a:rPr lang="en-US" sz="1800" b="1">
-                <a:latin typeface="+mn-lt"/>
-                <a:cs typeface="+mn-cs"/>
-              </a:rPr>
-              <a:t>Fine-tuned Transformer (DistilBERT) </a:t>
-            </a:r>
-            <a:r>
-              <a:rPr lang="en-US" sz="1800">
-                <a:latin typeface="+mn-lt"/>
-                <a:cs typeface="+mn-cs"/>
-              </a:rPr>
-              <a:t>ist gut geeignet, um Steam-Reviews in positiv oder negativ zu klassifizieren.</a:t>
-            </a:r>
-          </a:p>
-          <a:p>
-            <a:pPr indent="-228600" defTabSz="914400"/>
-            <a:r>
-              <a:rPr lang="en-US" sz="1800">
-                <a:latin typeface="+mn-lt"/>
-                <a:cs typeface="+mn-cs"/>
-              </a:rPr>
-              <a:t>Das </a:t>
-            </a:r>
-            <a:r>
-              <a:rPr lang="en-US" sz="1800" b="1">
-                <a:latin typeface="+mn-lt"/>
-                <a:cs typeface="+mn-cs"/>
-              </a:rPr>
-              <a:t>Preprocessing</a:t>
-            </a:r>
-            <a:r>
-              <a:rPr lang="en-US" sz="1800">
-                <a:latin typeface="+mn-lt"/>
-                <a:cs typeface="+mn-cs"/>
-              </a:rPr>
-              <a:t>, einschließlich der Hinzufügung von Spielinformationen und Emotionen, hat die Modellleistung signifikant verbessert.</a:t>
-            </a:r>
-          </a:p>
-          <a:p>
-            <a:pPr indent="-228600" defTabSz="914400"/>
-            <a:r>
-              <a:rPr lang="en-US" sz="1800">
-                <a:latin typeface="+mn-lt"/>
-                <a:cs typeface="+mn-cs"/>
-              </a:rPr>
-              <a:t>Unser Modell zeigt eine </a:t>
-            </a:r>
-            <a:r>
-              <a:rPr lang="en-US" sz="1800" b="1">
-                <a:latin typeface="+mn-lt"/>
-                <a:cs typeface="+mn-cs"/>
-              </a:rPr>
-              <a:t>überlegene Performance</a:t>
-            </a:r>
-            <a:r>
-              <a:rPr lang="en-US" sz="1800">
-                <a:latin typeface="+mn-lt"/>
-                <a:cs typeface="+mn-cs"/>
-              </a:rPr>
-              <a:t> im Vergleich zu den bestehenden State-of-the-Art Publikationen.</a:t>
-            </a:r>
-          </a:p>
-          <a:p>
-            <a:pPr indent="-228600" defTabSz="914400"/>
-            <a:r>
-              <a:rPr lang="en-US" sz="1800" b="1">
-                <a:latin typeface="+mn-lt"/>
-                <a:cs typeface="+mn-cs"/>
-              </a:rPr>
-              <a:t>Potenzial für Verbesserungen: </a:t>
-            </a:r>
-            <a:r>
-              <a:rPr lang="en-US" sz="1800">
-                <a:latin typeface="+mn-lt"/>
-                <a:cs typeface="+mn-cs"/>
-              </a:rPr>
-              <a:t>Eine spezifische Sarkasmus-Erkennung für Steam-Reviews könnte die Klassifikationsgenauigkeit weiter erhöhen.</a:t>
-            </a:r>
-          </a:p>
-        </p:txBody>
-      </p:sp>
-    </p:spTree>
-    <p:extLst>
-      <p:ext uri="{BB962C8B-B14F-4D97-AF65-F5344CB8AC3E}">
-        <p14:creationId xmlns:p14="http://schemas.microsoft.com/office/powerpoint/2010/main" val="1812718816"/>
       </p:ext>
     </p:extLst>
   </p:cSld>
@@ -12203,6 +13085,516 @@
     <p:extLst>
       <p:ext uri="{BB962C8B-B14F-4D97-AF65-F5344CB8AC3E}">
         <p14:creationId xmlns:p14="http://schemas.microsoft.com/office/powerpoint/2010/main" val="1881509882"/>
+      </p:ext>
+    </p:extLst>
+  </p:cSld>
+  <p:clrMapOvr>
+    <a:masterClrMapping/>
+  </p:clrMapOvr>
+</p:sld>
+</file>
+
+<file path=ppt/slides/slide20.xml><?xml version="1.0" encoding="utf-8"?>
+<p:sld xmlns:a="http://schemas.openxmlformats.org/drawingml/2006/main" xmlns:r="http://schemas.openxmlformats.org/officeDocument/2006/relationships" xmlns:p="http://schemas.openxmlformats.org/presentationml/2006/main">
+  <p:cSld>
+    <p:bg>
+      <p:bgPr>
+        <a:solidFill>
+          <a:schemeClr val="bg1"/>
+        </a:solidFill>
+        <a:effectLst/>
+      </p:bgPr>
+    </p:bg>
+    <p:spTree>
+      <p:nvGrpSpPr>
+        <p:cNvPr id="1" name=""/>
+        <p:cNvGrpSpPr/>
+        <p:nvPr/>
+      </p:nvGrpSpPr>
+      <p:grpSpPr>
+        <a:xfrm>
+          <a:off x="0" y="0"/>
+          <a:ext cx="0" cy="0"/>
+          <a:chOff x="0" y="0"/>
+          <a:chExt cx="0" cy="0"/>
+        </a:xfrm>
+      </p:grpSpPr>
+      <p:sp>
+        <p:nvSpPr>
+          <p:cNvPr id="10" name="Rectangle 9">
+            <a:extLst>
+              <a:ext uri="{FF2B5EF4-FFF2-40B4-BE49-F238E27FC236}">
+                <a16:creationId xmlns:a16="http://schemas.microsoft.com/office/drawing/2014/main" id="{70DFC902-7D23-471A-B557-B6B6917D7A0D}"/>
+              </a:ext>
+              <a:ext uri="{C183D7F6-B498-43B3-948B-1728B52AA6E4}">
+                <adec:decorative xmlns:adec="http://schemas.microsoft.com/office/drawing/2017/decorative" val="1"/>
+              </a:ext>
+            </a:extLst>
+          </p:cNvPr>
+          <p:cNvSpPr>
+            <a:spLocks noGrp="1" noRot="1" noChangeAspect="1" noMove="1" noResize="1" noEditPoints="1" noAdjustHandles="1" noChangeArrowheads="1" noChangeShapeType="1" noTextEdit="1"/>
+          </p:cNvSpPr>
+          <p:nvPr>
+            <p:extLst>
+              <p:ext uri="{386F3935-93C4-4BCD-93E2-E3B085C9AB24}">
+                <p16:designElem xmlns:p16="http://schemas.microsoft.com/office/powerpoint/2015/main" val="1"/>
+              </p:ext>
+            </p:extLst>
+          </p:nvPr>
+        </p:nvSpPr>
+        <p:spPr>
+          <a:xfrm>
+            <a:off x="7" y="-4278"/>
+            <a:ext cx="9143993" cy="1270758"/>
+          </a:xfrm>
+          <a:prstGeom prst="rect">
+            <a:avLst/>
+          </a:prstGeom>
+          <a:solidFill>
+            <a:schemeClr val="tx1">
+              <a:lumMod val="85000"/>
+              <a:lumOff val="15000"/>
+            </a:schemeClr>
+          </a:solidFill>
+          <a:ln>
+            <a:noFill/>
+          </a:ln>
+        </p:spPr>
+        <p:style>
+          <a:lnRef idx="2">
+            <a:schemeClr val="accent1">
+              <a:shade val="50000"/>
+            </a:schemeClr>
+          </a:lnRef>
+          <a:fillRef idx="1">
+            <a:schemeClr val="accent1"/>
+          </a:fillRef>
+          <a:effectRef idx="0">
+            <a:schemeClr val="accent1"/>
+          </a:effectRef>
+          <a:fontRef idx="minor">
+            <a:schemeClr val="lt1"/>
+          </a:fontRef>
+        </p:style>
+        <p:txBody>
+          <a:bodyPr rtlCol="0" anchor="ctr"/>
+          <a:lstStyle/>
+          <a:p>
+            <a:pPr algn="ctr"/>
+            <a:endParaRPr lang="en-US"/>
+          </a:p>
+        </p:txBody>
+      </p:sp>
+      <p:sp>
+        <p:nvSpPr>
+          <p:cNvPr id="2" name="Titel 1">
+            <a:extLst>
+              <a:ext uri="{FF2B5EF4-FFF2-40B4-BE49-F238E27FC236}">
+                <a16:creationId xmlns:a16="http://schemas.microsoft.com/office/drawing/2014/main" id="{AA173CEB-E837-0BAE-03A0-7E71432F2425}"/>
+              </a:ext>
+            </a:extLst>
+          </p:cNvPr>
+          <p:cNvSpPr>
+            <a:spLocks noGrp="1"/>
+          </p:cNvSpPr>
+          <p:nvPr>
+            <p:ph type="title"/>
+          </p:nvPr>
+        </p:nvSpPr>
+        <p:spPr>
+          <a:xfrm>
+            <a:off x="867638" y="478321"/>
+            <a:ext cx="7416372" cy="675098"/>
+          </a:xfrm>
+        </p:spPr>
+        <p:txBody>
+          <a:bodyPr vert="horz" lIns="91440" tIns="45720" rIns="91440" bIns="45720" rtlCol="0" anchor="t">
+            <a:normAutofit/>
+          </a:bodyPr>
+          <a:lstStyle/>
+          <a:p>
+            <a:pPr defTabSz="914400"/>
+            <a:r>
+              <a:rPr lang="en-US" sz="2100" b="1" kern="1200">
+                <a:solidFill>
+                  <a:schemeClr val="bg1"/>
+                </a:solidFill>
+                <a:latin typeface="+mj-lt"/>
+                <a:ea typeface="+mj-ea"/>
+                <a:cs typeface="+mj-cs"/>
+              </a:rPr>
+              <a:t>Conclusion</a:t>
+            </a:r>
+            <a:br>
+              <a:rPr lang="en-US" sz="2100" b="1" kern="1200">
+                <a:solidFill>
+                  <a:schemeClr val="bg1"/>
+                </a:solidFill>
+                <a:latin typeface="+mj-lt"/>
+                <a:ea typeface="+mj-ea"/>
+                <a:cs typeface="+mj-cs"/>
+              </a:rPr>
+            </a:br>
+            <a:endParaRPr lang="en-US" sz="2100" kern="1200">
+              <a:solidFill>
+                <a:schemeClr val="bg1"/>
+              </a:solidFill>
+              <a:latin typeface="+mj-lt"/>
+              <a:ea typeface="+mj-ea"/>
+              <a:cs typeface="+mj-cs"/>
+            </a:endParaRPr>
+          </a:p>
+        </p:txBody>
+      </p:sp>
+      <p:sp>
+        <p:nvSpPr>
+          <p:cNvPr id="12" name="Rectangle 11">
+            <a:extLst>
+              <a:ext uri="{FF2B5EF4-FFF2-40B4-BE49-F238E27FC236}">
+                <a16:creationId xmlns:a16="http://schemas.microsoft.com/office/drawing/2014/main" id="{A55D5633-D557-4DCA-982C-FF36EB7A1C00}"/>
+              </a:ext>
+              <a:ext uri="{C183D7F6-B498-43B3-948B-1728B52AA6E4}">
+                <adec:decorative xmlns:adec="http://schemas.microsoft.com/office/drawing/2017/decorative" val="1"/>
+              </a:ext>
+            </a:extLst>
+          </p:cNvPr>
+          <p:cNvSpPr>
+            <a:spLocks noGrp="1" noRot="1" noChangeAspect="1" noMove="1" noResize="1" noEditPoints="1" noAdjustHandles="1" noChangeArrowheads="1" noChangeShapeType="1" noTextEdit="1"/>
+          </p:cNvSpPr>
+          <p:nvPr>
+            <p:extLst>
+              <p:ext uri="{386F3935-93C4-4BCD-93E2-E3B085C9AB24}">
+                <p16:designElem xmlns:p16="http://schemas.microsoft.com/office/powerpoint/2015/main" val="1"/>
+              </p:ext>
+            </p:extLst>
+          </p:nvPr>
+        </p:nvSpPr>
+        <p:spPr>
+          <a:xfrm>
+            <a:off x="0" y="1266480"/>
+            <a:ext cx="9143992" cy="3877020"/>
+          </a:xfrm>
+          <a:prstGeom prst="rect">
+            <a:avLst/>
+          </a:prstGeom>
+          <a:solidFill>
+            <a:schemeClr val="bg1">
+              <a:lumMod val="95000"/>
+            </a:schemeClr>
+          </a:solidFill>
+          <a:ln>
+            <a:noFill/>
+          </a:ln>
+        </p:spPr>
+        <p:style>
+          <a:lnRef idx="2">
+            <a:schemeClr val="accent1">
+              <a:shade val="50000"/>
+            </a:schemeClr>
+          </a:lnRef>
+          <a:fillRef idx="1">
+            <a:schemeClr val="accent1"/>
+          </a:fillRef>
+          <a:effectRef idx="0">
+            <a:schemeClr val="accent1"/>
+          </a:effectRef>
+          <a:fontRef idx="minor">
+            <a:schemeClr val="lt1"/>
+          </a:fontRef>
+        </p:style>
+        <p:txBody>
+          <a:bodyPr rtlCol="0" anchor="ctr"/>
+          <a:lstStyle/>
+          <a:p>
+            <a:pPr algn="ctr"/>
+            <a:endParaRPr lang="en-US"/>
+          </a:p>
+        </p:txBody>
+      </p:sp>
+      <p:sp>
+        <p:nvSpPr>
+          <p:cNvPr id="14" name="Rectangle 13">
+            <a:extLst>
+              <a:ext uri="{FF2B5EF4-FFF2-40B4-BE49-F238E27FC236}">
+                <a16:creationId xmlns:a16="http://schemas.microsoft.com/office/drawing/2014/main" id="{450D3AD2-FA80-415F-A9CE-54D884561CD7}"/>
+              </a:ext>
+              <a:ext uri="{C183D7F6-B498-43B3-948B-1728B52AA6E4}">
+                <adec:decorative xmlns:adec="http://schemas.microsoft.com/office/drawing/2017/decorative" val="1"/>
+              </a:ext>
+            </a:extLst>
+          </p:cNvPr>
+          <p:cNvSpPr>
+            <a:spLocks noGrp="1" noRot="1" noChangeAspect="1" noMove="1" noResize="1" noEditPoints="1" noAdjustHandles="1" noChangeArrowheads="1" noChangeShapeType="1" noTextEdit="1"/>
+          </p:cNvSpPr>
+          <p:nvPr>
+            <p:extLst>
+              <p:ext uri="{386F3935-93C4-4BCD-93E2-E3B085C9AB24}">
+                <p16:designElem xmlns:p16="http://schemas.microsoft.com/office/powerpoint/2015/main" val="1"/>
+              </p:ext>
+            </p:extLst>
+          </p:nvPr>
+        </p:nvSpPr>
+        <p:spPr>
+          <a:xfrm>
+            <a:off x="867638" y="1508068"/>
+            <a:ext cx="342892" cy="34289"/>
+          </a:xfrm>
+          <a:prstGeom prst="rect">
+            <a:avLst/>
+          </a:prstGeom>
+          <a:solidFill>
+            <a:schemeClr val="tx1"/>
+          </a:solidFill>
+          <a:ln>
+            <a:noFill/>
+          </a:ln>
+        </p:spPr>
+        <p:style>
+          <a:lnRef idx="2">
+            <a:schemeClr val="accent1">
+              <a:shade val="50000"/>
+            </a:schemeClr>
+          </a:lnRef>
+          <a:fillRef idx="1">
+            <a:schemeClr val="accent1"/>
+          </a:fillRef>
+          <a:effectRef idx="0">
+            <a:schemeClr val="accent1"/>
+          </a:effectRef>
+          <a:fontRef idx="minor">
+            <a:schemeClr val="lt1"/>
+          </a:fontRef>
+        </p:style>
+        <p:txBody>
+          <a:bodyPr rtlCol="0" anchor="ctr"/>
+          <a:lstStyle/>
+          <a:p>
+            <a:pPr algn="ctr"/>
+            <a:endParaRPr lang="en-US"/>
+          </a:p>
+        </p:txBody>
+      </p:sp>
+      <p:sp>
+        <p:nvSpPr>
+          <p:cNvPr id="5" name="Foliennummernplatzhalter 4">
+            <a:extLst>
+              <a:ext uri="{FF2B5EF4-FFF2-40B4-BE49-F238E27FC236}">
+                <a16:creationId xmlns:a16="http://schemas.microsoft.com/office/drawing/2014/main" id="{EF8A3997-E730-C444-741A-2A39A636108C}"/>
+              </a:ext>
+            </a:extLst>
+          </p:cNvPr>
+          <p:cNvSpPr>
+            <a:spLocks noGrp="1"/>
+          </p:cNvSpPr>
+          <p:nvPr>
+            <p:ph type="sldNum" sz="quarter" idx="13"/>
+          </p:nvPr>
+        </p:nvSpPr>
+        <p:spPr>
+          <a:xfrm>
+            <a:off x="120650" y="2434829"/>
+            <a:ext cx="504718" cy="257826"/>
+          </a:xfrm>
+        </p:spPr>
+        <p:txBody>
+          <a:bodyPr vert="horz" lIns="91440" tIns="45720" rIns="91440" bIns="45720" rtlCol="0" anchor="ctr">
+            <a:normAutofit/>
+          </a:bodyPr>
+          <a:lstStyle/>
+          <a:p>
+            <a:pPr algn="ctr">
+              <a:lnSpc>
+                <a:spcPct val="90000"/>
+              </a:lnSpc>
+              <a:spcAft>
+                <a:spcPts val="600"/>
+              </a:spcAft>
+            </a:pPr>
+            <a:fld id="{9C057DB4-583E-41A7-BD94-987342018C17}" type="slidenum">
+              <a:rPr lang="en-US" sz="1100"/>
+              <a:pPr algn="ctr">
+                <a:lnSpc>
+                  <a:spcPct val="90000"/>
+                </a:lnSpc>
+                <a:spcAft>
+                  <a:spcPts val="600"/>
+                </a:spcAft>
+              </a:pPr>
+              <a:t>20</a:t>
+            </a:fld>
+            <a:endParaRPr lang="en-US" sz="1100" dirty="0"/>
+          </a:p>
+        </p:txBody>
+      </p:sp>
+      <p:sp>
+        <p:nvSpPr>
+          <p:cNvPr id="4" name="Fußzeilenplatzhalter 3">
+            <a:extLst>
+              <a:ext uri="{FF2B5EF4-FFF2-40B4-BE49-F238E27FC236}">
+                <a16:creationId xmlns:a16="http://schemas.microsoft.com/office/drawing/2014/main" id="{7AAE7A8F-5FC3-6455-6DC9-5F4477588EF8}"/>
+              </a:ext>
+            </a:extLst>
+          </p:cNvPr>
+          <p:cNvSpPr>
+            <a:spLocks noGrp="1"/>
+          </p:cNvSpPr>
+          <p:nvPr>
+            <p:ph type="ftr" sz="quarter" idx="12"/>
+          </p:nvPr>
+        </p:nvSpPr>
+        <p:spPr>
+          <a:xfrm rot="5400000">
+            <a:off x="-262383" y="3919521"/>
+            <a:ext cx="1247620" cy="235134"/>
+          </a:xfrm>
+        </p:spPr>
+        <p:txBody>
+          <a:bodyPr vert="horz" lIns="91440" tIns="45720" rIns="91440" bIns="45720" rtlCol="0" anchor="ctr">
+            <a:normAutofit/>
+          </a:bodyPr>
+          <a:lstStyle/>
+          <a:p>
+            <a:pPr>
+              <a:lnSpc>
+                <a:spcPct val="90000"/>
+              </a:lnSpc>
+              <a:spcAft>
+                <a:spcPts val="600"/>
+              </a:spcAft>
+            </a:pPr>
+            <a:r>
+              <a:rPr lang="en-US" sz="500" kern="1200">
+                <a:latin typeface="+mn-lt"/>
+                <a:ea typeface="+mn-ea"/>
+                <a:cs typeface="+mn-cs"/>
+              </a:rPr>
+              <a:t>Steam Review Prediction | Grau, Kosma, Yildiz | 24.10.2024</a:t>
+            </a:r>
+          </a:p>
+        </p:txBody>
+      </p:sp>
+      <p:sp>
+        <p:nvSpPr>
+          <p:cNvPr id="3" name="Textplatzhalter 2">
+            <a:extLst>
+              <a:ext uri="{FF2B5EF4-FFF2-40B4-BE49-F238E27FC236}">
+                <a16:creationId xmlns:a16="http://schemas.microsoft.com/office/drawing/2014/main" id="{36BD0A61-2E8F-D955-F135-C67AC5AB44B6}"/>
+              </a:ext>
+            </a:extLst>
+          </p:cNvPr>
+          <p:cNvSpPr>
+            <a:spLocks noGrp="1"/>
+          </p:cNvSpPr>
+          <p:nvPr>
+            <p:ph type="body" sz="quarter" idx="14"/>
+          </p:nvPr>
+        </p:nvSpPr>
+        <p:spPr>
+          <a:xfrm>
+            <a:off x="866661" y="1663007"/>
+            <a:ext cx="7410669" cy="2969714"/>
+          </a:xfrm>
+        </p:spPr>
+        <p:txBody>
+          <a:bodyPr vert="horz" lIns="91440" tIns="45720" rIns="91440" bIns="45720" rtlCol="0">
+            <a:normAutofit/>
+          </a:bodyPr>
+          <a:lstStyle/>
+          <a:p>
+            <a:pPr indent="-228600" defTabSz="914400"/>
+            <a:r>
+              <a:rPr lang="en-US" sz="1800">
+                <a:latin typeface="+mn-lt"/>
+                <a:cs typeface="+mn-cs"/>
+              </a:rPr>
+              <a:t>Der </a:t>
+            </a:r>
+            <a:r>
+              <a:rPr lang="en-US" sz="1800" b="1">
+                <a:latin typeface="+mn-lt"/>
+                <a:cs typeface="+mn-cs"/>
+              </a:rPr>
+              <a:t>Fine-tuned Transformer (DistilBERT) </a:t>
+            </a:r>
+            <a:r>
+              <a:rPr lang="en-US" sz="1800">
+                <a:latin typeface="+mn-lt"/>
+                <a:cs typeface="+mn-cs"/>
+              </a:rPr>
+              <a:t>ist gut geeignet, um Steam-Reviews in positiv oder negativ zu klassifizieren.</a:t>
+            </a:r>
+          </a:p>
+          <a:p>
+            <a:pPr indent="-228600" defTabSz="914400"/>
+            <a:r>
+              <a:rPr lang="en-US" sz="1800">
+                <a:latin typeface="+mn-lt"/>
+                <a:cs typeface="+mn-cs"/>
+              </a:rPr>
+              <a:t>Das </a:t>
+            </a:r>
+            <a:r>
+              <a:rPr lang="en-US" sz="1800" b="1">
+                <a:latin typeface="+mn-lt"/>
+                <a:cs typeface="+mn-cs"/>
+              </a:rPr>
+              <a:t>Preprocessing</a:t>
+            </a:r>
+            <a:r>
+              <a:rPr lang="en-US" sz="1800">
+                <a:latin typeface="+mn-lt"/>
+                <a:cs typeface="+mn-cs"/>
+              </a:rPr>
+              <a:t>, einschließlich der Hinzufügung von Spielinformationen und Emotionen, hat die Modellleistung signifikant verbessert.</a:t>
+            </a:r>
+          </a:p>
+          <a:p>
+            <a:pPr indent="-228600" defTabSz="914400"/>
+            <a:r>
+              <a:rPr lang="en-US" sz="1800">
+                <a:latin typeface="+mn-lt"/>
+                <a:cs typeface="+mn-cs"/>
+              </a:rPr>
+              <a:t>Unser Modell zeigt eine </a:t>
+            </a:r>
+            <a:r>
+              <a:rPr lang="en-US" sz="1800" b="1">
+                <a:latin typeface="+mn-lt"/>
+                <a:cs typeface="+mn-cs"/>
+              </a:rPr>
+              <a:t>überlegene Performance</a:t>
+            </a:r>
+            <a:r>
+              <a:rPr lang="en-US" sz="1800">
+                <a:latin typeface="+mn-lt"/>
+                <a:cs typeface="+mn-cs"/>
+              </a:rPr>
+              <a:t> im Vergleich zu den bestehenden State-of-the-Art Publikationen.</a:t>
+            </a:r>
+          </a:p>
+          <a:p>
+            <a:pPr indent="-228600" defTabSz="914400"/>
+            <a:r>
+              <a:rPr lang="en-US" sz="1800" b="1">
+                <a:latin typeface="+mn-lt"/>
+                <a:cs typeface="+mn-cs"/>
+              </a:rPr>
+              <a:t>Potenzial für Verbesserungen: </a:t>
+            </a:r>
+            <a:r>
+              <a:rPr lang="en-US" sz="1800">
+                <a:latin typeface="+mn-lt"/>
+                <a:cs typeface="+mn-cs"/>
+              </a:rPr>
+              <a:t>Eine spezifische Sarkasmus-Erkennung für Steam-Reviews könnte die Klassifikationsgenauigkeit weiter erhöhen.</a:t>
+            </a:r>
+          </a:p>
+        </p:txBody>
+      </p:sp>
+    </p:spTree>
+    <p:extLst>
+      <p:ext uri="{BB962C8B-B14F-4D97-AF65-F5344CB8AC3E}">
+        <p14:creationId xmlns:p14="http://schemas.microsoft.com/office/powerpoint/2010/main" val="1812718816"/>
       </p:ext>
     </p:extLst>
   </p:cSld>

</xml_diff>